<commit_message>
Created a standalone Flask application for #2, #6. Containerizing in progress. Also completed Proof-of-concept use case for #10.
</commit_message>
<xml_diff>
--- a/Documentation/Microservices-Overview/Project-1.pptx
+++ b/Documentation/Microservices-Overview/Project-1.pptx
@@ -5,10 +5,11 @@
     <p:sldMasterId id="2147483648" r:id="rId1"/>
   </p:sldMasterIdLst>
   <p:notesMasterIdLst>
-    <p:notesMasterId r:id="rId3"/>
+    <p:notesMasterId r:id="rId4"/>
   </p:notesMasterIdLst>
   <p:sldIdLst>
     <p:sldId id="256" r:id="rId2"/>
+    <p:sldId id="257" r:id="rId3"/>
   </p:sldIdLst>
   <p:sldSz cx="12192000" cy="6858000"/>
   <p:notesSz cx="6858000" cy="9144000"/>
@@ -107,6 +108,11 @@
       </a:defRPr>
     </a:lvl9pPr>
   </p:defaultTextStyle>
+  <p:extLst>
+    <p:ext uri="{EFAFB233-063F-42B5-8137-9DF3F51BA10A}">
+      <p15:sldGuideLst xmlns:p15="http://schemas.microsoft.com/office/powerpoint/2012/main"/>
+    </p:ext>
+  </p:extLst>
 </p:presentation>
 </file>
 
@@ -192,7 +198,7 @@
           <a:p>
             <a:fld id="{3E1A328A-B8BC-4540-95DA-19C2F94B77F0}" type="datetimeFigureOut">
               <a:rPr lang="en-US" smtClean="0"/>
-              <a:t>1/18/2022</a:t>
+              <a:t>1/27/2022</a:t>
             </a:fld>
             <a:endParaRPr lang="en-US"/>
           </a:p>
@@ -606,7 +612,7 @@
           <a:p>
             <a:fld id="{E926811D-2EFE-408E-BA24-55010182C721}" type="datetime1">
               <a:rPr lang="en-US" smtClean="0"/>
-              <a:t>1/18/2022</a:t>
+              <a:t>1/27/2022</a:t>
             </a:fld>
             <a:endParaRPr lang="en-US"/>
           </a:p>
@@ -807,7 +813,7 @@
           <a:p>
             <a:fld id="{64E80CFF-3AA6-4335-A27A-E92ECC4F856E}" type="datetime1">
               <a:rPr lang="en-US" smtClean="0"/>
-              <a:t>1/18/2022</a:t>
+              <a:t>1/27/2022</a:t>
             </a:fld>
             <a:endParaRPr lang="en-US"/>
           </a:p>
@@ -1018,7 +1024,7 @@
           <a:p>
             <a:fld id="{793F8674-B2BC-49F0-B9CE-32FD8D694C7A}" type="datetime1">
               <a:rPr lang="en-US" smtClean="0"/>
-              <a:t>1/18/2022</a:t>
+              <a:t>1/27/2022</a:t>
             </a:fld>
             <a:endParaRPr lang="en-US"/>
           </a:p>
@@ -1219,7 +1225,7 @@
           <a:p>
             <a:fld id="{D5DE6E7C-6D0A-4112-995F-36C865ECE3BC}" type="datetime1">
               <a:rPr lang="en-US" smtClean="0"/>
-              <a:t>1/18/2022</a:t>
+              <a:t>1/27/2022</a:t>
             </a:fld>
             <a:endParaRPr lang="en-US"/>
           </a:p>
@@ -1497,7 +1503,7 @@
           <a:p>
             <a:fld id="{760ECB2D-2CAC-4F45-954A-C1A024ACB90F}" type="datetime1">
               <a:rPr lang="en-US" smtClean="0"/>
-              <a:t>1/18/2022</a:t>
+              <a:t>1/27/2022</a:t>
             </a:fld>
             <a:endParaRPr lang="en-US"/>
           </a:p>
@@ -1765,7 +1771,7 @@
           <a:p>
             <a:fld id="{70ABC677-4754-4AE8-8F37-A1839674EF04}" type="datetime1">
               <a:rPr lang="en-US" smtClean="0"/>
-              <a:t>1/18/2022</a:t>
+              <a:t>1/27/2022</a:t>
             </a:fld>
             <a:endParaRPr lang="en-US"/>
           </a:p>
@@ -2180,7 +2186,7 @@
           <a:p>
             <a:fld id="{D4AF4F23-4FE9-425B-B1B0-01DF72631999}" type="datetime1">
               <a:rPr lang="en-US" smtClean="0"/>
-              <a:t>1/18/2022</a:t>
+              <a:t>1/27/2022</a:t>
             </a:fld>
             <a:endParaRPr lang="en-US"/>
           </a:p>
@@ -2324,7 +2330,7 @@
           <a:p>
             <a:fld id="{D22C47EF-92A0-4626-B43C-6FF33525BE90}" type="datetime1">
               <a:rPr lang="en-US" smtClean="0"/>
-              <a:t>1/18/2022</a:t>
+              <a:t>1/27/2022</a:t>
             </a:fld>
             <a:endParaRPr lang="en-US"/>
           </a:p>
@@ -2440,7 +2446,7 @@
           <a:p>
             <a:fld id="{92505B2A-0953-4936-89B3-0F0A153E1FA2}" type="datetime1">
               <a:rPr lang="en-US" smtClean="0"/>
-              <a:t>1/18/2022</a:t>
+              <a:t>1/27/2022</a:t>
             </a:fld>
             <a:endParaRPr lang="en-US"/>
           </a:p>
@@ -2754,7 +2760,7 @@
           <a:p>
             <a:fld id="{33C5DC8D-E93E-471E-A8FB-BDC5EDEA0DD4}" type="datetime1">
               <a:rPr lang="en-US" smtClean="0"/>
-              <a:t>1/18/2022</a:t>
+              <a:t>1/27/2022</a:t>
             </a:fld>
             <a:endParaRPr lang="en-US"/>
           </a:p>
@@ -3045,7 +3051,7 @@
           <a:p>
             <a:fld id="{AA324CBB-EF1D-4431-BBDF-59749BE16884}" type="datetime1">
               <a:rPr lang="en-US" smtClean="0"/>
-              <a:t>1/18/2022</a:t>
+              <a:t>1/27/2022</a:t>
             </a:fld>
             <a:endParaRPr lang="en-US"/>
           </a:p>
@@ -3289,7 +3295,7 @@
           <a:p>
             <a:fld id="{2578A7D8-4877-4FA8-9054-1DFE9AA17A94}" type="datetime1">
               <a:rPr lang="en-US" smtClean="0"/>
-              <a:t>1/18/2022</a:t>
+              <a:t>1/27/2022</a:t>
             </a:fld>
             <a:endParaRPr lang="en-US"/>
           </a:p>
@@ -5246,6 +5252,3203 @@
     <p:extLst>
       <p:ext uri="{BB962C8B-B14F-4D97-AF65-F5344CB8AC3E}">
         <p14:creationId xmlns:p14="http://schemas.microsoft.com/office/powerpoint/2010/main" val="1381937583"/>
+      </p:ext>
+    </p:extLst>
+  </p:cSld>
+  <p:clrMapOvr>
+    <a:masterClrMapping/>
+  </p:clrMapOvr>
+</p:sld>
+</file>
+
+<file path=ppt/slides/slide2.xml><?xml version="1.0" encoding="utf-8"?>
+<p:sld xmlns:a="http://schemas.openxmlformats.org/drawingml/2006/main" xmlns:r="http://schemas.openxmlformats.org/officeDocument/2006/relationships" xmlns:p="http://schemas.openxmlformats.org/presentationml/2006/main">
+  <p:cSld>
+    <p:spTree>
+      <p:nvGrpSpPr>
+        <p:cNvPr id="1" name=""/>
+        <p:cNvGrpSpPr/>
+        <p:nvPr/>
+      </p:nvGrpSpPr>
+      <p:grpSpPr>
+        <a:xfrm>
+          <a:off x="0" y="0"/>
+          <a:ext cx="0" cy="0"/>
+          <a:chOff x="0" y="0"/>
+          <a:chExt cx="0" cy="0"/>
+        </a:xfrm>
+      </p:grpSpPr>
+      <p:sp>
+        <p:nvSpPr>
+          <p:cNvPr id="2" name="Footer Placeholder 1">
+            <a:extLst>
+              <a:ext uri="{FF2B5EF4-FFF2-40B4-BE49-F238E27FC236}">
+                <a16:creationId xmlns:a16="http://schemas.microsoft.com/office/drawing/2014/main" id="{598897C3-2A70-4BB3-A7FB-80552182FA6F}"/>
+              </a:ext>
+            </a:extLst>
+          </p:cNvPr>
+          <p:cNvSpPr>
+            <a:spLocks noGrp="1"/>
+          </p:cNvSpPr>
+          <p:nvPr>
+            <p:ph type="ftr" sz="quarter" idx="11"/>
+          </p:nvPr>
+        </p:nvSpPr>
+        <p:spPr/>
+        <p:txBody>
+          <a:bodyPr/>
+          <a:lstStyle/>
+          <a:p>
+            <a:r>
+              <a:rPr lang="en-US"/>
+              <a:t>MOCKUP</a:t>
+            </a:r>
+          </a:p>
+        </p:txBody>
+      </p:sp>
+      <p:sp>
+        <p:nvSpPr>
+          <p:cNvPr id="41" name="TextBox 1">
+            <a:extLst>
+              <a:ext uri="{FF2B5EF4-FFF2-40B4-BE49-F238E27FC236}">
+                <a16:creationId xmlns:a16="http://schemas.microsoft.com/office/drawing/2014/main" id="{6B682C35-4DA1-43F0-9306-5AD466958810}"/>
+              </a:ext>
+            </a:extLst>
+          </p:cNvPr>
+          <p:cNvSpPr txBox="1"/>
+          <p:nvPr/>
+        </p:nvSpPr>
+        <p:spPr>
+          <a:xfrm>
+            <a:off x="500735" y="3014967"/>
+            <a:ext cx="870404" cy="828066"/>
+          </a:xfrm>
+          <a:prstGeom prst="rect">
+            <a:avLst/>
+          </a:prstGeom>
+          <a:ln/>
+        </p:spPr>
+        <p:style>
+          <a:lnRef idx="1">
+            <a:schemeClr val="accent1"/>
+          </a:lnRef>
+          <a:fillRef idx="3">
+            <a:schemeClr val="accent1"/>
+          </a:fillRef>
+          <a:effectRef idx="2">
+            <a:schemeClr val="accent1"/>
+          </a:effectRef>
+          <a:fontRef idx="minor">
+            <a:schemeClr val="lt1"/>
+          </a:fontRef>
+        </p:style>
+        <p:txBody>
+          <a:bodyPr wrap="square" rtlCol="0" anchor="ctr"/>
+          <a:lstStyle>
+            <a:lvl1pPr marL="0" indent="0">
+              <a:defRPr sz="1100">
+                <a:solidFill>
+                  <a:schemeClr val="dk1"/>
+                </a:solidFill>
+                <a:latin typeface="+mn-lt"/>
+                <a:ea typeface="+mn-ea"/>
+                <a:cs typeface="+mn-cs"/>
+              </a:defRPr>
+            </a:lvl1pPr>
+            <a:lvl2pPr marL="457200" indent="0">
+              <a:defRPr sz="1100">
+                <a:solidFill>
+                  <a:schemeClr val="dk1"/>
+                </a:solidFill>
+                <a:latin typeface="+mn-lt"/>
+                <a:ea typeface="+mn-ea"/>
+                <a:cs typeface="+mn-cs"/>
+              </a:defRPr>
+            </a:lvl2pPr>
+            <a:lvl3pPr marL="914400" indent="0">
+              <a:defRPr sz="1100">
+                <a:solidFill>
+                  <a:schemeClr val="dk1"/>
+                </a:solidFill>
+                <a:latin typeface="+mn-lt"/>
+                <a:ea typeface="+mn-ea"/>
+                <a:cs typeface="+mn-cs"/>
+              </a:defRPr>
+            </a:lvl3pPr>
+            <a:lvl4pPr marL="1371600" indent="0">
+              <a:defRPr sz="1100">
+                <a:solidFill>
+                  <a:schemeClr val="dk1"/>
+                </a:solidFill>
+                <a:latin typeface="+mn-lt"/>
+                <a:ea typeface="+mn-ea"/>
+                <a:cs typeface="+mn-cs"/>
+              </a:defRPr>
+            </a:lvl4pPr>
+            <a:lvl5pPr marL="1828800" indent="0">
+              <a:defRPr sz="1100">
+                <a:solidFill>
+                  <a:schemeClr val="dk1"/>
+                </a:solidFill>
+                <a:latin typeface="+mn-lt"/>
+                <a:ea typeface="+mn-ea"/>
+                <a:cs typeface="+mn-cs"/>
+              </a:defRPr>
+            </a:lvl5pPr>
+            <a:lvl6pPr marL="2286000" indent="0">
+              <a:defRPr sz="1100">
+                <a:solidFill>
+                  <a:schemeClr val="dk1"/>
+                </a:solidFill>
+                <a:latin typeface="+mn-lt"/>
+                <a:ea typeface="+mn-ea"/>
+                <a:cs typeface="+mn-cs"/>
+              </a:defRPr>
+            </a:lvl6pPr>
+            <a:lvl7pPr marL="2743200" indent="0">
+              <a:defRPr sz="1100">
+                <a:solidFill>
+                  <a:schemeClr val="dk1"/>
+                </a:solidFill>
+                <a:latin typeface="+mn-lt"/>
+                <a:ea typeface="+mn-ea"/>
+                <a:cs typeface="+mn-cs"/>
+              </a:defRPr>
+            </a:lvl7pPr>
+            <a:lvl8pPr marL="3200400" indent="0">
+              <a:defRPr sz="1100">
+                <a:solidFill>
+                  <a:schemeClr val="dk1"/>
+                </a:solidFill>
+                <a:latin typeface="+mn-lt"/>
+                <a:ea typeface="+mn-ea"/>
+                <a:cs typeface="+mn-cs"/>
+              </a:defRPr>
+            </a:lvl8pPr>
+            <a:lvl9pPr marL="3657600" indent="0">
+              <a:defRPr sz="1100">
+                <a:solidFill>
+                  <a:schemeClr val="dk1"/>
+                </a:solidFill>
+                <a:latin typeface="+mn-lt"/>
+                <a:ea typeface="+mn-ea"/>
+                <a:cs typeface="+mn-cs"/>
+              </a:defRPr>
+            </a:lvl9pPr>
+          </a:lstStyle>
+          <a:p>
+            <a:pPr algn="ctr"/>
+            <a:r>
+              <a:rPr lang="en-US">
+                <a:solidFill>
+                  <a:schemeClr val="bg1"/>
+                </a:solidFill>
+              </a:rPr>
+              <a:t>FRONT</a:t>
+            </a:r>
+            <a:r>
+              <a:rPr lang="en-US" baseline="0">
+                <a:solidFill>
+                  <a:schemeClr val="bg1"/>
+                </a:solidFill>
+              </a:rPr>
+              <a:t> END (CLIENT)</a:t>
+            </a:r>
+            <a:endParaRPr lang="en-US">
+              <a:solidFill>
+                <a:schemeClr val="bg1"/>
+              </a:solidFill>
+            </a:endParaRPr>
+          </a:p>
+        </p:txBody>
+      </p:sp>
+      <p:sp>
+        <p:nvSpPr>
+          <p:cNvPr id="43" name="TextBox 3">
+            <a:extLst>
+              <a:ext uri="{FF2B5EF4-FFF2-40B4-BE49-F238E27FC236}">
+                <a16:creationId xmlns:a16="http://schemas.microsoft.com/office/drawing/2014/main" id="{780F0727-EEA1-434F-AC42-0308718340C1}"/>
+              </a:ext>
+            </a:extLst>
+          </p:cNvPr>
+          <p:cNvSpPr txBox="1"/>
+          <p:nvPr/>
+        </p:nvSpPr>
+        <p:spPr>
+          <a:xfrm>
+            <a:off x="2222181" y="1712989"/>
+            <a:ext cx="1228327" cy="3432020"/>
+          </a:xfrm>
+          <a:prstGeom prst="rect">
+            <a:avLst/>
+          </a:prstGeom>
+          <a:ln/>
+        </p:spPr>
+        <p:style>
+          <a:lnRef idx="1">
+            <a:schemeClr val="accent1"/>
+          </a:lnRef>
+          <a:fillRef idx="3">
+            <a:schemeClr val="accent1"/>
+          </a:fillRef>
+          <a:effectRef idx="2">
+            <a:schemeClr val="accent1"/>
+          </a:effectRef>
+          <a:fontRef idx="minor">
+            <a:schemeClr val="lt1"/>
+          </a:fontRef>
+        </p:style>
+        <p:txBody>
+          <a:bodyPr wrap="square" rtlCol="0" anchor="ctr"/>
+          <a:lstStyle>
+            <a:lvl1pPr marL="0" indent="0">
+              <a:defRPr sz="1100">
+                <a:solidFill>
+                  <a:schemeClr val="dk1"/>
+                </a:solidFill>
+                <a:latin typeface="+mn-lt"/>
+                <a:ea typeface="+mn-ea"/>
+                <a:cs typeface="+mn-cs"/>
+              </a:defRPr>
+            </a:lvl1pPr>
+            <a:lvl2pPr marL="457200" indent="0">
+              <a:defRPr sz="1100">
+                <a:solidFill>
+                  <a:schemeClr val="dk1"/>
+                </a:solidFill>
+                <a:latin typeface="+mn-lt"/>
+                <a:ea typeface="+mn-ea"/>
+                <a:cs typeface="+mn-cs"/>
+              </a:defRPr>
+            </a:lvl2pPr>
+            <a:lvl3pPr marL="914400" indent="0">
+              <a:defRPr sz="1100">
+                <a:solidFill>
+                  <a:schemeClr val="dk1"/>
+                </a:solidFill>
+                <a:latin typeface="+mn-lt"/>
+                <a:ea typeface="+mn-ea"/>
+                <a:cs typeface="+mn-cs"/>
+              </a:defRPr>
+            </a:lvl3pPr>
+            <a:lvl4pPr marL="1371600" indent="0">
+              <a:defRPr sz="1100">
+                <a:solidFill>
+                  <a:schemeClr val="dk1"/>
+                </a:solidFill>
+                <a:latin typeface="+mn-lt"/>
+                <a:ea typeface="+mn-ea"/>
+                <a:cs typeface="+mn-cs"/>
+              </a:defRPr>
+            </a:lvl4pPr>
+            <a:lvl5pPr marL="1828800" indent="0">
+              <a:defRPr sz="1100">
+                <a:solidFill>
+                  <a:schemeClr val="dk1"/>
+                </a:solidFill>
+                <a:latin typeface="+mn-lt"/>
+                <a:ea typeface="+mn-ea"/>
+                <a:cs typeface="+mn-cs"/>
+              </a:defRPr>
+            </a:lvl5pPr>
+            <a:lvl6pPr marL="2286000" indent="0">
+              <a:defRPr sz="1100">
+                <a:solidFill>
+                  <a:schemeClr val="dk1"/>
+                </a:solidFill>
+                <a:latin typeface="+mn-lt"/>
+                <a:ea typeface="+mn-ea"/>
+                <a:cs typeface="+mn-cs"/>
+              </a:defRPr>
+            </a:lvl6pPr>
+            <a:lvl7pPr marL="2743200" indent="0">
+              <a:defRPr sz="1100">
+                <a:solidFill>
+                  <a:schemeClr val="dk1"/>
+                </a:solidFill>
+                <a:latin typeface="+mn-lt"/>
+                <a:ea typeface="+mn-ea"/>
+                <a:cs typeface="+mn-cs"/>
+              </a:defRPr>
+            </a:lvl7pPr>
+            <a:lvl8pPr marL="3200400" indent="0">
+              <a:defRPr sz="1100">
+                <a:solidFill>
+                  <a:schemeClr val="dk1"/>
+                </a:solidFill>
+                <a:latin typeface="+mn-lt"/>
+                <a:ea typeface="+mn-ea"/>
+                <a:cs typeface="+mn-cs"/>
+              </a:defRPr>
+            </a:lvl8pPr>
+            <a:lvl9pPr marL="3657600" indent="0">
+              <a:defRPr sz="1100">
+                <a:solidFill>
+                  <a:schemeClr val="dk1"/>
+                </a:solidFill>
+                <a:latin typeface="+mn-lt"/>
+                <a:ea typeface="+mn-ea"/>
+                <a:cs typeface="+mn-cs"/>
+              </a:defRPr>
+            </a:lvl9pPr>
+          </a:lstStyle>
+          <a:p>
+            <a:pPr algn="ctr"/>
+            <a:r>
+              <a:rPr lang="en-US" dirty="0">
+                <a:solidFill>
+                  <a:schemeClr val="bg1"/>
+                </a:solidFill>
+              </a:rPr>
+              <a:t>API</a:t>
+            </a:r>
+            <a:r>
+              <a:rPr lang="en-US" baseline="0" dirty="0">
+                <a:solidFill>
+                  <a:schemeClr val="bg1"/>
+                </a:solidFill>
+              </a:rPr>
+              <a:t> GATEWAY</a:t>
+            </a:r>
+            <a:endParaRPr lang="en-US" dirty="0">
+              <a:solidFill>
+                <a:schemeClr val="bg1"/>
+              </a:solidFill>
+            </a:endParaRPr>
+          </a:p>
+        </p:txBody>
+      </p:sp>
+      <p:sp>
+        <p:nvSpPr>
+          <p:cNvPr id="44" name="Arrow: Left-Right 43">
+            <a:extLst>
+              <a:ext uri="{FF2B5EF4-FFF2-40B4-BE49-F238E27FC236}">
+                <a16:creationId xmlns:a16="http://schemas.microsoft.com/office/drawing/2014/main" id="{C1DBA7B4-68C5-4687-BD96-B35E6C80F512}"/>
+              </a:ext>
+            </a:extLst>
+          </p:cNvPr>
+          <p:cNvSpPr/>
+          <p:nvPr/>
+        </p:nvSpPr>
+        <p:spPr>
+          <a:xfrm>
+            <a:off x="3779267" y="1815892"/>
+            <a:ext cx="787106" cy="293423"/>
+          </a:xfrm>
+          <a:prstGeom prst="leftRightArrow">
+            <a:avLst/>
+          </a:prstGeom>
+        </p:spPr>
+        <p:style>
+          <a:lnRef idx="1">
+            <a:schemeClr val="accent3"/>
+          </a:lnRef>
+          <a:fillRef idx="2">
+            <a:schemeClr val="accent3"/>
+          </a:fillRef>
+          <a:effectRef idx="1">
+            <a:schemeClr val="accent3"/>
+          </a:effectRef>
+          <a:fontRef idx="minor">
+            <a:schemeClr val="dk1"/>
+          </a:fontRef>
+        </p:style>
+        <p:txBody>
+          <a:bodyPr rtlCol="0" anchor="ctr"/>
+          <a:lstStyle>
+            <a:lvl1pPr marL="0" indent="0">
+              <a:defRPr sz="1100">
+                <a:solidFill>
+                  <a:schemeClr val="lt1"/>
+                </a:solidFill>
+                <a:latin typeface="+mn-lt"/>
+                <a:ea typeface="+mn-ea"/>
+                <a:cs typeface="+mn-cs"/>
+              </a:defRPr>
+            </a:lvl1pPr>
+            <a:lvl2pPr marL="457200" indent="0">
+              <a:defRPr sz="1100">
+                <a:solidFill>
+                  <a:schemeClr val="lt1"/>
+                </a:solidFill>
+                <a:latin typeface="+mn-lt"/>
+                <a:ea typeface="+mn-ea"/>
+                <a:cs typeface="+mn-cs"/>
+              </a:defRPr>
+            </a:lvl2pPr>
+            <a:lvl3pPr marL="914400" indent="0">
+              <a:defRPr sz="1100">
+                <a:solidFill>
+                  <a:schemeClr val="lt1"/>
+                </a:solidFill>
+                <a:latin typeface="+mn-lt"/>
+                <a:ea typeface="+mn-ea"/>
+                <a:cs typeface="+mn-cs"/>
+              </a:defRPr>
+            </a:lvl3pPr>
+            <a:lvl4pPr marL="1371600" indent="0">
+              <a:defRPr sz="1100">
+                <a:solidFill>
+                  <a:schemeClr val="lt1"/>
+                </a:solidFill>
+                <a:latin typeface="+mn-lt"/>
+                <a:ea typeface="+mn-ea"/>
+                <a:cs typeface="+mn-cs"/>
+              </a:defRPr>
+            </a:lvl4pPr>
+            <a:lvl5pPr marL="1828800" indent="0">
+              <a:defRPr sz="1100">
+                <a:solidFill>
+                  <a:schemeClr val="lt1"/>
+                </a:solidFill>
+                <a:latin typeface="+mn-lt"/>
+                <a:ea typeface="+mn-ea"/>
+                <a:cs typeface="+mn-cs"/>
+              </a:defRPr>
+            </a:lvl5pPr>
+            <a:lvl6pPr marL="2286000" indent="0">
+              <a:defRPr sz="1100">
+                <a:solidFill>
+                  <a:schemeClr val="lt1"/>
+                </a:solidFill>
+                <a:latin typeface="+mn-lt"/>
+                <a:ea typeface="+mn-ea"/>
+                <a:cs typeface="+mn-cs"/>
+              </a:defRPr>
+            </a:lvl6pPr>
+            <a:lvl7pPr marL="2743200" indent="0">
+              <a:defRPr sz="1100">
+                <a:solidFill>
+                  <a:schemeClr val="lt1"/>
+                </a:solidFill>
+                <a:latin typeface="+mn-lt"/>
+                <a:ea typeface="+mn-ea"/>
+                <a:cs typeface="+mn-cs"/>
+              </a:defRPr>
+            </a:lvl7pPr>
+            <a:lvl8pPr marL="3200400" indent="0">
+              <a:defRPr sz="1100">
+                <a:solidFill>
+                  <a:schemeClr val="lt1"/>
+                </a:solidFill>
+                <a:latin typeface="+mn-lt"/>
+                <a:ea typeface="+mn-ea"/>
+                <a:cs typeface="+mn-cs"/>
+              </a:defRPr>
+            </a:lvl8pPr>
+            <a:lvl9pPr marL="3657600" indent="0">
+              <a:defRPr sz="1100">
+                <a:solidFill>
+                  <a:schemeClr val="lt1"/>
+                </a:solidFill>
+                <a:latin typeface="+mn-lt"/>
+                <a:ea typeface="+mn-ea"/>
+                <a:cs typeface="+mn-cs"/>
+              </a:defRPr>
+            </a:lvl9pPr>
+          </a:lstStyle>
+          <a:p>
+            <a:pPr algn="ctr"/>
+            <a:endParaRPr lang="en-US"/>
+          </a:p>
+        </p:txBody>
+      </p:sp>
+      <p:sp>
+        <p:nvSpPr>
+          <p:cNvPr id="45" name="TextBox 6">
+            <a:extLst>
+              <a:ext uri="{FF2B5EF4-FFF2-40B4-BE49-F238E27FC236}">
+                <a16:creationId xmlns:a16="http://schemas.microsoft.com/office/drawing/2014/main" id="{B14E4562-E677-4BE4-97A5-3639F80EDCFC}"/>
+              </a:ext>
+            </a:extLst>
+          </p:cNvPr>
+          <p:cNvSpPr txBox="1"/>
+          <p:nvPr/>
+        </p:nvSpPr>
+        <p:spPr>
+          <a:xfrm>
+            <a:off x="4928143" y="1317972"/>
+            <a:ext cx="1306681" cy="610065"/>
+          </a:xfrm>
+          <a:prstGeom prst="rect">
+            <a:avLst/>
+          </a:prstGeom>
+          <a:ln/>
+        </p:spPr>
+        <p:style>
+          <a:lnRef idx="1">
+            <a:schemeClr val="accent1"/>
+          </a:lnRef>
+          <a:fillRef idx="3">
+            <a:schemeClr val="accent1"/>
+          </a:fillRef>
+          <a:effectRef idx="2">
+            <a:schemeClr val="accent1"/>
+          </a:effectRef>
+          <a:fontRef idx="minor">
+            <a:schemeClr val="lt1"/>
+          </a:fontRef>
+        </p:style>
+        <p:txBody>
+          <a:bodyPr wrap="square" rtlCol="0" anchor="ctr"/>
+          <a:lstStyle>
+            <a:lvl1pPr marL="0" indent="0">
+              <a:defRPr sz="1100">
+                <a:solidFill>
+                  <a:schemeClr val="dk1"/>
+                </a:solidFill>
+                <a:latin typeface="+mn-lt"/>
+                <a:ea typeface="+mn-ea"/>
+                <a:cs typeface="+mn-cs"/>
+              </a:defRPr>
+            </a:lvl1pPr>
+            <a:lvl2pPr marL="457200" indent="0">
+              <a:defRPr sz="1100">
+                <a:solidFill>
+                  <a:schemeClr val="dk1"/>
+                </a:solidFill>
+                <a:latin typeface="+mn-lt"/>
+                <a:ea typeface="+mn-ea"/>
+                <a:cs typeface="+mn-cs"/>
+              </a:defRPr>
+            </a:lvl2pPr>
+            <a:lvl3pPr marL="914400" indent="0">
+              <a:defRPr sz="1100">
+                <a:solidFill>
+                  <a:schemeClr val="dk1"/>
+                </a:solidFill>
+                <a:latin typeface="+mn-lt"/>
+                <a:ea typeface="+mn-ea"/>
+                <a:cs typeface="+mn-cs"/>
+              </a:defRPr>
+            </a:lvl3pPr>
+            <a:lvl4pPr marL="1371600" indent="0">
+              <a:defRPr sz="1100">
+                <a:solidFill>
+                  <a:schemeClr val="dk1"/>
+                </a:solidFill>
+                <a:latin typeface="+mn-lt"/>
+                <a:ea typeface="+mn-ea"/>
+                <a:cs typeface="+mn-cs"/>
+              </a:defRPr>
+            </a:lvl4pPr>
+            <a:lvl5pPr marL="1828800" indent="0">
+              <a:defRPr sz="1100">
+                <a:solidFill>
+                  <a:schemeClr val="dk1"/>
+                </a:solidFill>
+                <a:latin typeface="+mn-lt"/>
+                <a:ea typeface="+mn-ea"/>
+                <a:cs typeface="+mn-cs"/>
+              </a:defRPr>
+            </a:lvl5pPr>
+            <a:lvl6pPr marL="2286000" indent="0">
+              <a:defRPr sz="1100">
+                <a:solidFill>
+                  <a:schemeClr val="dk1"/>
+                </a:solidFill>
+                <a:latin typeface="+mn-lt"/>
+                <a:ea typeface="+mn-ea"/>
+                <a:cs typeface="+mn-cs"/>
+              </a:defRPr>
+            </a:lvl6pPr>
+            <a:lvl7pPr marL="2743200" indent="0">
+              <a:defRPr sz="1100">
+                <a:solidFill>
+                  <a:schemeClr val="dk1"/>
+                </a:solidFill>
+                <a:latin typeface="+mn-lt"/>
+                <a:ea typeface="+mn-ea"/>
+                <a:cs typeface="+mn-cs"/>
+              </a:defRPr>
+            </a:lvl7pPr>
+            <a:lvl8pPr marL="3200400" indent="0">
+              <a:defRPr sz="1100">
+                <a:solidFill>
+                  <a:schemeClr val="dk1"/>
+                </a:solidFill>
+                <a:latin typeface="+mn-lt"/>
+                <a:ea typeface="+mn-ea"/>
+                <a:cs typeface="+mn-cs"/>
+              </a:defRPr>
+            </a:lvl8pPr>
+            <a:lvl9pPr marL="3657600" indent="0">
+              <a:defRPr sz="1100">
+                <a:solidFill>
+                  <a:schemeClr val="dk1"/>
+                </a:solidFill>
+                <a:latin typeface="+mn-lt"/>
+                <a:ea typeface="+mn-ea"/>
+                <a:cs typeface="+mn-cs"/>
+              </a:defRPr>
+            </a:lvl9pPr>
+          </a:lstStyle>
+          <a:p>
+            <a:pPr algn="ctr"/>
+            <a:r>
+              <a:rPr lang="en-US">
+                <a:solidFill>
+                  <a:schemeClr val="bg1"/>
+                </a:solidFill>
+              </a:rPr>
+              <a:t>AUTHENTICATION</a:t>
+            </a:r>
+            <a:r>
+              <a:rPr lang="en-US" baseline="0">
+                <a:solidFill>
+                  <a:schemeClr val="bg1"/>
+                </a:solidFill>
+              </a:rPr>
+              <a:t> MICROSERVICE</a:t>
+            </a:r>
+            <a:endParaRPr lang="en-US">
+              <a:solidFill>
+                <a:schemeClr val="bg1"/>
+              </a:solidFill>
+            </a:endParaRPr>
+          </a:p>
+        </p:txBody>
+      </p:sp>
+      <p:sp>
+        <p:nvSpPr>
+          <p:cNvPr id="46" name="Arrow: Left-Right 45">
+            <a:extLst>
+              <a:ext uri="{FF2B5EF4-FFF2-40B4-BE49-F238E27FC236}">
+                <a16:creationId xmlns:a16="http://schemas.microsoft.com/office/drawing/2014/main" id="{B0DCF402-117A-4BC1-A532-DD3F10D29D3B}"/>
+              </a:ext>
+            </a:extLst>
+          </p:cNvPr>
+          <p:cNvSpPr/>
+          <p:nvPr/>
+        </p:nvSpPr>
+        <p:spPr>
+          <a:xfrm>
+            <a:off x="3779267" y="2553144"/>
+            <a:ext cx="787106" cy="293423"/>
+          </a:xfrm>
+          <a:prstGeom prst="leftRightArrow">
+            <a:avLst/>
+          </a:prstGeom>
+        </p:spPr>
+        <p:style>
+          <a:lnRef idx="1">
+            <a:schemeClr val="accent3"/>
+          </a:lnRef>
+          <a:fillRef idx="2">
+            <a:schemeClr val="accent3"/>
+          </a:fillRef>
+          <a:effectRef idx="1">
+            <a:schemeClr val="accent3"/>
+          </a:effectRef>
+          <a:fontRef idx="minor">
+            <a:schemeClr val="dk1"/>
+          </a:fontRef>
+        </p:style>
+        <p:txBody>
+          <a:bodyPr rtlCol="0" anchor="ctr"/>
+          <a:lstStyle>
+            <a:lvl1pPr marL="0" indent="0">
+              <a:defRPr sz="1100">
+                <a:solidFill>
+                  <a:schemeClr val="lt1"/>
+                </a:solidFill>
+                <a:latin typeface="+mn-lt"/>
+                <a:ea typeface="+mn-ea"/>
+                <a:cs typeface="+mn-cs"/>
+              </a:defRPr>
+            </a:lvl1pPr>
+            <a:lvl2pPr marL="457200" indent="0">
+              <a:defRPr sz="1100">
+                <a:solidFill>
+                  <a:schemeClr val="lt1"/>
+                </a:solidFill>
+                <a:latin typeface="+mn-lt"/>
+                <a:ea typeface="+mn-ea"/>
+                <a:cs typeface="+mn-cs"/>
+              </a:defRPr>
+            </a:lvl2pPr>
+            <a:lvl3pPr marL="914400" indent="0">
+              <a:defRPr sz="1100">
+                <a:solidFill>
+                  <a:schemeClr val="lt1"/>
+                </a:solidFill>
+                <a:latin typeface="+mn-lt"/>
+                <a:ea typeface="+mn-ea"/>
+                <a:cs typeface="+mn-cs"/>
+              </a:defRPr>
+            </a:lvl3pPr>
+            <a:lvl4pPr marL="1371600" indent="0">
+              <a:defRPr sz="1100">
+                <a:solidFill>
+                  <a:schemeClr val="lt1"/>
+                </a:solidFill>
+                <a:latin typeface="+mn-lt"/>
+                <a:ea typeface="+mn-ea"/>
+                <a:cs typeface="+mn-cs"/>
+              </a:defRPr>
+            </a:lvl4pPr>
+            <a:lvl5pPr marL="1828800" indent="0">
+              <a:defRPr sz="1100">
+                <a:solidFill>
+                  <a:schemeClr val="lt1"/>
+                </a:solidFill>
+                <a:latin typeface="+mn-lt"/>
+                <a:ea typeface="+mn-ea"/>
+                <a:cs typeface="+mn-cs"/>
+              </a:defRPr>
+            </a:lvl5pPr>
+            <a:lvl6pPr marL="2286000" indent="0">
+              <a:defRPr sz="1100">
+                <a:solidFill>
+                  <a:schemeClr val="lt1"/>
+                </a:solidFill>
+                <a:latin typeface="+mn-lt"/>
+                <a:ea typeface="+mn-ea"/>
+                <a:cs typeface="+mn-cs"/>
+              </a:defRPr>
+            </a:lvl6pPr>
+            <a:lvl7pPr marL="2743200" indent="0">
+              <a:defRPr sz="1100">
+                <a:solidFill>
+                  <a:schemeClr val="lt1"/>
+                </a:solidFill>
+                <a:latin typeface="+mn-lt"/>
+                <a:ea typeface="+mn-ea"/>
+                <a:cs typeface="+mn-cs"/>
+              </a:defRPr>
+            </a:lvl7pPr>
+            <a:lvl8pPr marL="3200400" indent="0">
+              <a:defRPr sz="1100">
+                <a:solidFill>
+                  <a:schemeClr val="lt1"/>
+                </a:solidFill>
+                <a:latin typeface="+mn-lt"/>
+                <a:ea typeface="+mn-ea"/>
+                <a:cs typeface="+mn-cs"/>
+              </a:defRPr>
+            </a:lvl8pPr>
+            <a:lvl9pPr marL="3657600" indent="0">
+              <a:defRPr sz="1100">
+                <a:solidFill>
+                  <a:schemeClr val="lt1"/>
+                </a:solidFill>
+                <a:latin typeface="+mn-lt"/>
+                <a:ea typeface="+mn-ea"/>
+                <a:cs typeface="+mn-cs"/>
+              </a:defRPr>
+            </a:lvl9pPr>
+          </a:lstStyle>
+          <a:p>
+            <a:pPr algn="ctr"/>
+            <a:endParaRPr lang="en-US"/>
+          </a:p>
+        </p:txBody>
+      </p:sp>
+      <p:sp>
+        <p:nvSpPr>
+          <p:cNvPr id="47" name="TextBox 9">
+            <a:extLst>
+              <a:ext uri="{FF2B5EF4-FFF2-40B4-BE49-F238E27FC236}">
+                <a16:creationId xmlns:a16="http://schemas.microsoft.com/office/drawing/2014/main" id="{2DA52402-32F2-4B43-911B-06B11BF801D9}"/>
+              </a:ext>
+            </a:extLst>
+          </p:cNvPr>
+          <p:cNvSpPr txBox="1"/>
+          <p:nvPr/>
+        </p:nvSpPr>
+        <p:spPr>
+          <a:xfrm>
+            <a:off x="5038228" y="2274371"/>
+            <a:ext cx="1080161" cy="736891"/>
+          </a:xfrm>
+          <a:prstGeom prst="rect">
+            <a:avLst/>
+          </a:prstGeom>
+          <a:ln/>
+        </p:spPr>
+        <p:style>
+          <a:lnRef idx="1">
+            <a:schemeClr val="accent1"/>
+          </a:lnRef>
+          <a:fillRef idx="3">
+            <a:schemeClr val="accent1"/>
+          </a:fillRef>
+          <a:effectRef idx="2">
+            <a:schemeClr val="accent1"/>
+          </a:effectRef>
+          <a:fontRef idx="minor">
+            <a:schemeClr val="lt1"/>
+          </a:fontRef>
+        </p:style>
+        <p:txBody>
+          <a:bodyPr wrap="square" rtlCol="0" anchor="ctr"/>
+          <a:lstStyle>
+            <a:lvl1pPr marL="0" indent="0">
+              <a:defRPr sz="1100">
+                <a:solidFill>
+                  <a:schemeClr val="dk1"/>
+                </a:solidFill>
+                <a:latin typeface="+mn-lt"/>
+                <a:ea typeface="+mn-ea"/>
+                <a:cs typeface="+mn-cs"/>
+              </a:defRPr>
+            </a:lvl1pPr>
+            <a:lvl2pPr marL="457200" indent="0">
+              <a:defRPr sz="1100">
+                <a:solidFill>
+                  <a:schemeClr val="dk1"/>
+                </a:solidFill>
+                <a:latin typeface="+mn-lt"/>
+                <a:ea typeface="+mn-ea"/>
+                <a:cs typeface="+mn-cs"/>
+              </a:defRPr>
+            </a:lvl2pPr>
+            <a:lvl3pPr marL="914400" indent="0">
+              <a:defRPr sz="1100">
+                <a:solidFill>
+                  <a:schemeClr val="dk1"/>
+                </a:solidFill>
+                <a:latin typeface="+mn-lt"/>
+                <a:ea typeface="+mn-ea"/>
+                <a:cs typeface="+mn-cs"/>
+              </a:defRPr>
+            </a:lvl3pPr>
+            <a:lvl4pPr marL="1371600" indent="0">
+              <a:defRPr sz="1100">
+                <a:solidFill>
+                  <a:schemeClr val="dk1"/>
+                </a:solidFill>
+                <a:latin typeface="+mn-lt"/>
+                <a:ea typeface="+mn-ea"/>
+                <a:cs typeface="+mn-cs"/>
+              </a:defRPr>
+            </a:lvl4pPr>
+            <a:lvl5pPr marL="1828800" indent="0">
+              <a:defRPr sz="1100">
+                <a:solidFill>
+                  <a:schemeClr val="dk1"/>
+                </a:solidFill>
+                <a:latin typeface="+mn-lt"/>
+                <a:ea typeface="+mn-ea"/>
+                <a:cs typeface="+mn-cs"/>
+              </a:defRPr>
+            </a:lvl5pPr>
+            <a:lvl6pPr marL="2286000" indent="0">
+              <a:defRPr sz="1100">
+                <a:solidFill>
+                  <a:schemeClr val="dk1"/>
+                </a:solidFill>
+                <a:latin typeface="+mn-lt"/>
+                <a:ea typeface="+mn-ea"/>
+                <a:cs typeface="+mn-cs"/>
+              </a:defRPr>
+            </a:lvl6pPr>
+            <a:lvl7pPr marL="2743200" indent="0">
+              <a:defRPr sz="1100">
+                <a:solidFill>
+                  <a:schemeClr val="dk1"/>
+                </a:solidFill>
+                <a:latin typeface="+mn-lt"/>
+                <a:ea typeface="+mn-ea"/>
+                <a:cs typeface="+mn-cs"/>
+              </a:defRPr>
+            </a:lvl7pPr>
+            <a:lvl8pPr marL="3200400" indent="0">
+              <a:defRPr sz="1100">
+                <a:solidFill>
+                  <a:schemeClr val="dk1"/>
+                </a:solidFill>
+                <a:latin typeface="+mn-lt"/>
+                <a:ea typeface="+mn-ea"/>
+                <a:cs typeface="+mn-cs"/>
+              </a:defRPr>
+            </a:lvl8pPr>
+            <a:lvl9pPr marL="3657600" indent="0">
+              <a:defRPr sz="1100">
+                <a:solidFill>
+                  <a:schemeClr val="dk1"/>
+                </a:solidFill>
+                <a:latin typeface="+mn-lt"/>
+                <a:ea typeface="+mn-ea"/>
+                <a:cs typeface="+mn-cs"/>
+              </a:defRPr>
+            </a:lvl9pPr>
+          </a:lstStyle>
+          <a:p>
+            <a:pPr algn="ctr"/>
+            <a:r>
+              <a:rPr lang="en-US">
+                <a:solidFill>
+                  <a:schemeClr val="bg1"/>
+                </a:solidFill>
+              </a:rPr>
+              <a:t>AUDIT SAVE/FETCH MICROSERVICE</a:t>
+            </a:r>
+          </a:p>
+        </p:txBody>
+      </p:sp>
+      <p:sp>
+        <p:nvSpPr>
+          <p:cNvPr id="48" name="Arrow: Left-Right 47">
+            <a:extLst>
+              <a:ext uri="{FF2B5EF4-FFF2-40B4-BE49-F238E27FC236}">
+                <a16:creationId xmlns:a16="http://schemas.microsoft.com/office/drawing/2014/main" id="{489B2D1B-254F-4179-8D0B-60DB9A6C968D}"/>
+              </a:ext>
+            </a:extLst>
+          </p:cNvPr>
+          <p:cNvSpPr/>
+          <p:nvPr/>
+        </p:nvSpPr>
+        <p:spPr>
+          <a:xfrm>
+            <a:off x="3779267" y="4569302"/>
+            <a:ext cx="787106" cy="293423"/>
+          </a:xfrm>
+          <a:prstGeom prst="leftRightArrow">
+            <a:avLst/>
+          </a:prstGeom>
+        </p:spPr>
+        <p:style>
+          <a:lnRef idx="1">
+            <a:schemeClr val="accent3"/>
+          </a:lnRef>
+          <a:fillRef idx="2">
+            <a:schemeClr val="accent3"/>
+          </a:fillRef>
+          <a:effectRef idx="1">
+            <a:schemeClr val="accent3"/>
+          </a:effectRef>
+          <a:fontRef idx="minor">
+            <a:schemeClr val="dk1"/>
+          </a:fontRef>
+        </p:style>
+        <p:txBody>
+          <a:bodyPr rtlCol="0" anchor="ctr"/>
+          <a:lstStyle>
+            <a:lvl1pPr marL="0" indent="0">
+              <a:defRPr sz="1100">
+                <a:solidFill>
+                  <a:schemeClr val="lt1"/>
+                </a:solidFill>
+                <a:latin typeface="+mn-lt"/>
+                <a:ea typeface="+mn-ea"/>
+                <a:cs typeface="+mn-cs"/>
+              </a:defRPr>
+            </a:lvl1pPr>
+            <a:lvl2pPr marL="457200" indent="0">
+              <a:defRPr sz="1100">
+                <a:solidFill>
+                  <a:schemeClr val="lt1"/>
+                </a:solidFill>
+                <a:latin typeface="+mn-lt"/>
+                <a:ea typeface="+mn-ea"/>
+                <a:cs typeface="+mn-cs"/>
+              </a:defRPr>
+            </a:lvl2pPr>
+            <a:lvl3pPr marL="914400" indent="0">
+              <a:defRPr sz="1100">
+                <a:solidFill>
+                  <a:schemeClr val="lt1"/>
+                </a:solidFill>
+                <a:latin typeface="+mn-lt"/>
+                <a:ea typeface="+mn-ea"/>
+                <a:cs typeface="+mn-cs"/>
+              </a:defRPr>
+            </a:lvl3pPr>
+            <a:lvl4pPr marL="1371600" indent="0">
+              <a:defRPr sz="1100">
+                <a:solidFill>
+                  <a:schemeClr val="lt1"/>
+                </a:solidFill>
+                <a:latin typeface="+mn-lt"/>
+                <a:ea typeface="+mn-ea"/>
+                <a:cs typeface="+mn-cs"/>
+              </a:defRPr>
+            </a:lvl4pPr>
+            <a:lvl5pPr marL="1828800" indent="0">
+              <a:defRPr sz="1100">
+                <a:solidFill>
+                  <a:schemeClr val="lt1"/>
+                </a:solidFill>
+                <a:latin typeface="+mn-lt"/>
+                <a:ea typeface="+mn-ea"/>
+                <a:cs typeface="+mn-cs"/>
+              </a:defRPr>
+            </a:lvl5pPr>
+            <a:lvl6pPr marL="2286000" indent="0">
+              <a:defRPr sz="1100">
+                <a:solidFill>
+                  <a:schemeClr val="lt1"/>
+                </a:solidFill>
+                <a:latin typeface="+mn-lt"/>
+                <a:ea typeface="+mn-ea"/>
+                <a:cs typeface="+mn-cs"/>
+              </a:defRPr>
+            </a:lvl6pPr>
+            <a:lvl7pPr marL="2743200" indent="0">
+              <a:defRPr sz="1100">
+                <a:solidFill>
+                  <a:schemeClr val="lt1"/>
+                </a:solidFill>
+                <a:latin typeface="+mn-lt"/>
+                <a:ea typeface="+mn-ea"/>
+                <a:cs typeface="+mn-cs"/>
+              </a:defRPr>
+            </a:lvl7pPr>
+            <a:lvl8pPr marL="3200400" indent="0">
+              <a:defRPr sz="1100">
+                <a:solidFill>
+                  <a:schemeClr val="lt1"/>
+                </a:solidFill>
+                <a:latin typeface="+mn-lt"/>
+                <a:ea typeface="+mn-ea"/>
+                <a:cs typeface="+mn-cs"/>
+              </a:defRPr>
+            </a:lvl8pPr>
+            <a:lvl9pPr marL="3657600" indent="0">
+              <a:defRPr sz="1100">
+                <a:solidFill>
+                  <a:schemeClr val="lt1"/>
+                </a:solidFill>
+                <a:latin typeface="+mn-lt"/>
+                <a:ea typeface="+mn-ea"/>
+                <a:cs typeface="+mn-cs"/>
+              </a:defRPr>
+            </a:lvl9pPr>
+          </a:lstStyle>
+          <a:p>
+            <a:pPr algn="ctr"/>
+            <a:endParaRPr lang="en-US"/>
+          </a:p>
+        </p:txBody>
+      </p:sp>
+      <p:sp>
+        <p:nvSpPr>
+          <p:cNvPr id="49" name="TextBox 13">
+            <a:extLst>
+              <a:ext uri="{FF2B5EF4-FFF2-40B4-BE49-F238E27FC236}">
+                <a16:creationId xmlns:a16="http://schemas.microsoft.com/office/drawing/2014/main" id="{E91E4D49-37F2-48A0-9C39-E58C0448845F}"/>
+              </a:ext>
+            </a:extLst>
+          </p:cNvPr>
+          <p:cNvSpPr txBox="1"/>
+          <p:nvPr/>
+        </p:nvSpPr>
+        <p:spPr>
+          <a:xfrm>
+            <a:off x="5024114" y="4488407"/>
+            <a:ext cx="1143495" cy="656602"/>
+          </a:xfrm>
+          <a:prstGeom prst="rect">
+            <a:avLst/>
+          </a:prstGeom>
+          <a:ln/>
+        </p:spPr>
+        <p:style>
+          <a:lnRef idx="1">
+            <a:schemeClr val="accent1"/>
+          </a:lnRef>
+          <a:fillRef idx="3">
+            <a:schemeClr val="accent1"/>
+          </a:fillRef>
+          <a:effectRef idx="2">
+            <a:schemeClr val="accent1"/>
+          </a:effectRef>
+          <a:fontRef idx="minor">
+            <a:schemeClr val="lt1"/>
+          </a:fontRef>
+        </p:style>
+        <p:txBody>
+          <a:bodyPr wrap="square" rtlCol="0" anchor="ctr"/>
+          <a:lstStyle>
+            <a:lvl1pPr marL="0" indent="0">
+              <a:defRPr sz="1100">
+                <a:solidFill>
+                  <a:schemeClr val="dk1"/>
+                </a:solidFill>
+                <a:latin typeface="+mn-lt"/>
+                <a:ea typeface="+mn-ea"/>
+                <a:cs typeface="+mn-cs"/>
+              </a:defRPr>
+            </a:lvl1pPr>
+            <a:lvl2pPr marL="457200" indent="0">
+              <a:defRPr sz="1100">
+                <a:solidFill>
+                  <a:schemeClr val="dk1"/>
+                </a:solidFill>
+                <a:latin typeface="+mn-lt"/>
+                <a:ea typeface="+mn-ea"/>
+                <a:cs typeface="+mn-cs"/>
+              </a:defRPr>
+            </a:lvl2pPr>
+            <a:lvl3pPr marL="914400" indent="0">
+              <a:defRPr sz="1100">
+                <a:solidFill>
+                  <a:schemeClr val="dk1"/>
+                </a:solidFill>
+                <a:latin typeface="+mn-lt"/>
+                <a:ea typeface="+mn-ea"/>
+                <a:cs typeface="+mn-cs"/>
+              </a:defRPr>
+            </a:lvl3pPr>
+            <a:lvl4pPr marL="1371600" indent="0">
+              <a:defRPr sz="1100">
+                <a:solidFill>
+                  <a:schemeClr val="dk1"/>
+                </a:solidFill>
+                <a:latin typeface="+mn-lt"/>
+                <a:ea typeface="+mn-ea"/>
+                <a:cs typeface="+mn-cs"/>
+              </a:defRPr>
+            </a:lvl4pPr>
+            <a:lvl5pPr marL="1828800" indent="0">
+              <a:defRPr sz="1100">
+                <a:solidFill>
+                  <a:schemeClr val="dk1"/>
+                </a:solidFill>
+                <a:latin typeface="+mn-lt"/>
+                <a:ea typeface="+mn-ea"/>
+                <a:cs typeface="+mn-cs"/>
+              </a:defRPr>
+            </a:lvl5pPr>
+            <a:lvl6pPr marL="2286000" indent="0">
+              <a:defRPr sz="1100">
+                <a:solidFill>
+                  <a:schemeClr val="dk1"/>
+                </a:solidFill>
+                <a:latin typeface="+mn-lt"/>
+                <a:ea typeface="+mn-ea"/>
+                <a:cs typeface="+mn-cs"/>
+              </a:defRPr>
+            </a:lvl6pPr>
+            <a:lvl7pPr marL="2743200" indent="0">
+              <a:defRPr sz="1100">
+                <a:solidFill>
+                  <a:schemeClr val="dk1"/>
+                </a:solidFill>
+                <a:latin typeface="+mn-lt"/>
+                <a:ea typeface="+mn-ea"/>
+                <a:cs typeface="+mn-cs"/>
+              </a:defRPr>
+            </a:lvl7pPr>
+            <a:lvl8pPr marL="3200400" indent="0">
+              <a:defRPr sz="1100">
+                <a:solidFill>
+                  <a:schemeClr val="dk1"/>
+                </a:solidFill>
+                <a:latin typeface="+mn-lt"/>
+                <a:ea typeface="+mn-ea"/>
+                <a:cs typeface="+mn-cs"/>
+              </a:defRPr>
+            </a:lvl8pPr>
+            <a:lvl9pPr marL="3657600" indent="0">
+              <a:defRPr sz="1100">
+                <a:solidFill>
+                  <a:schemeClr val="dk1"/>
+                </a:solidFill>
+                <a:latin typeface="+mn-lt"/>
+                <a:ea typeface="+mn-ea"/>
+                <a:cs typeface="+mn-cs"/>
+              </a:defRPr>
+            </a:lvl9pPr>
+          </a:lstStyle>
+          <a:p>
+            <a:pPr algn="ctr"/>
+            <a:r>
+              <a:rPr lang="en-US" dirty="0">
+                <a:solidFill>
+                  <a:schemeClr val="bg1"/>
+                </a:solidFill>
+              </a:rPr>
+              <a:t>NEXRAD AWS DATA FETCH AND PROCESS</a:t>
+            </a:r>
+          </a:p>
+        </p:txBody>
+      </p:sp>
+      <p:sp>
+        <p:nvSpPr>
+          <p:cNvPr id="50" name="Arrow: Left-Right 49">
+            <a:extLst>
+              <a:ext uri="{FF2B5EF4-FFF2-40B4-BE49-F238E27FC236}">
+                <a16:creationId xmlns:a16="http://schemas.microsoft.com/office/drawing/2014/main" id="{D6B3F889-F82A-4FA2-99C3-80E0342B3CFB}"/>
+              </a:ext>
+            </a:extLst>
+          </p:cNvPr>
+          <p:cNvSpPr/>
+          <p:nvPr/>
+        </p:nvSpPr>
+        <p:spPr>
+          <a:xfrm>
+            <a:off x="3779267" y="3881705"/>
+            <a:ext cx="787106" cy="293423"/>
+          </a:xfrm>
+          <a:prstGeom prst="leftRightArrow">
+            <a:avLst/>
+          </a:prstGeom>
+        </p:spPr>
+        <p:style>
+          <a:lnRef idx="1">
+            <a:schemeClr val="accent3"/>
+          </a:lnRef>
+          <a:fillRef idx="2">
+            <a:schemeClr val="accent3"/>
+          </a:fillRef>
+          <a:effectRef idx="1">
+            <a:schemeClr val="accent3"/>
+          </a:effectRef>
+          <a:fontRef idx="minor">
+            <a:schemeClr val="dk1"/>
+          </a:fontRef>
+        </p:style>
+        <p:txBody>
+          <a:bodyPr rtlCol="0" anchor="ctr"/>
+          <a:lstStyle>
+            <a:lvl1pPr marL="0" indent="0">
+              <a:defRPr sz="1100">
+                <a:solidFill>
+                  <a:schemeClr val="lt1"/>
+                </a:solidFill>
+                <a:latin typeface="+mn-lt"/>
+                <a:ea typeface="+mn-ea"/>
+                <a:cs typeface="+mn-cs"/>
+              </a:defRPr>
+            </a:lvl1pPr>
+            <a:lvl2pPr marL="457200" indent="0">
+              <a:defRPr sz="1100">
+                <a:solidFill>
+                  <a:schemeClr val="lt1"/>
+                </a:solidFill>
+                <a:latin typeface="+mn-lt"/>
+                <a:ea typeface="+mn-ea"/>
+                <a:cs typeface="+mn-cs"/>
+              </a:defRPr>
+            </a:lvl2pPr>
+            <a:lvl3pPr marL="914400" indent="0">
+              <a:defRPr sz="1100">
+                <a:solidFill>
+                  <a:schemeClr val="lt1"/>
+                </a:solidFill>
+                <a:latin typeface="+mn-lt"/>
+                <a:ea typeface="+mn-ea"/>
+                <a:cs typeface="+mn-cs"/>
+              </a:defRPr>
+            </a:lvl3pPr>
+            <a:lvl4pPr marL="1371600" indent="0">
+              <a:defRPr sz="1100">
+                <a:solidFill>
+                  <a:schemeClr val="lt1"/>
+                </a:solidFill>
+                <a:latin typeface="+mn-lt"/>
+                <a:ea typeface="+mn-ea"/>
+                <a:cs typeface="+mn-cs"/>
+              </a:defRPr>
+            </a:lvl4pPr>
+            <a:lvl5pPr marL="1828800" indent="0">
+              <a:defRPr sz="1100">
+                <a:solidFill>
+                  <a:schemeClr val="lt1"/>
+                </a:solidFill>
+                <a:latin typeface="+mn-lt"/>
+                <a:ea typeface="+mn-ea"/>
+                <a:cs typeface="+mn-cs"/>
+              </a:defRPr>
+            </a:lvl5pPr>
+            <a:lvl6pPr marL="2286000" indent="0">
+              <a:defRPr sz="1100">
+                <a:solidFill>
+                  <a:schemeClr val="lt1"/>
+                </a:solidFill>
+                <a:latin typeface="+mn-lt"/>
+                <a:ea typeface="+mn-ea"/>
+                <a:cs typeface="+mn-cs"/>
+              </a:defRPr>
+            </a:lvl6pPr>
+            <a:lvl7pPr marL="2743200" indent="0">
+              <a:defRPr sz="1100">
+                <a:solidFill>
+                  <a:schemeClr val="lt1"/>
+                </a:solidFill>
+                <a:latin typeface="+mn-lt"/>
+                <a:ea typeface="+mn-ea"/>
+                <a:cs typeface="+mn-cs"/>
+              </a:defRPr>
+            </a:lvl7pPr>
+            <a:lvl8pPr marL="3200400" indent="0">
+              <a:defRPr sz="1100">
+                <a:solidFill>
+                  <a:schemeClr val="lt1"/>
+                </a:solidFill>
+                <a:latin typeface="+mn-lt"/>
+                <a:ea typeface="+mn-ea"/>
+                <a:cs typeface="+mn-cs"/>
+              </a:defRPr>
+            </a:lvl8pPr>
+            <a:lvl9pPr marL="3657600" indent="0">
+              <a:defRPr sz="1100">
+                <a:solidFill>
+                  <a:schemeClr val="lt1"/>
+                </a:solidFill>
+                <a:latin typeface="+mn-lt"/>
+                <a:ea typeface="+mn-ea"/>
+                <a:cs typeface="+mn-cs"/>
+              </a:defRPr>
+            </a:lvl9pPr>
+          </a:lstStyle>
+          <a:p>
+            <a:pPr algn="ctr"/>
+            <a:endParaRPr lang="en-US"/>
+          </a:p>
+        </p:txBody>
+      </p:sp>
+      <p:sp>
+        <p:nvSpPr>
+          <p:cNvPr id="51" name="TextBox 15">
+            <a:extLst>
+              <a:ext uri="{FF2B5EF4-FFF2-40B4-BE49-F238E27FC236}">
+                <a16:creationId xmlns:a16="http://schemas.microsoft.com/office/drawing/2014/main" id="{0C12F564-DA2B-4343-A332-022D819B217C}"/>
+              </a:ext>
+            </a:extLst>
+          </p:cNvPr>
+          <p:cNvSpPr txBox="1"/>
+          <p:nvPr/>
+        </p:nvSpPr>
+        <p:spPr>
+          <a:xfrm>
+            <a:off x="5009737" y="3747452"/>
+            <a:ext cx="1143495" cy="564165"/>
+          </a:xfrm>
+          <a:prstGeom prst="rect">
+            <a:avLst/>
+          </a:prstGeom>
+          <a:ln/>
+        </p:spPr>
+        <p:style>
+          <a:lnRef idx="1">
+            <a:schemeClr val="accent1"/>
+          </a:lnRef>
+          <a:fillRef idx="3">
+            <a:schemeClr val="accent1"/>
+          </a:fillRef>
+          <a:effectRef idx="2">
+            <a:schemeClr val="accent1"/>
+          </a:effectRef>
+          <a:fontRef idx="minor">
+            <a:schemeClr val="lt1"/>
+          </a:fontRef>
+        </p:style>
+        <p:txBody>
+          <a:bodyPr wrap="square" rtlCol="0" anchor="ctr"/>
+          <a:lstStyle>
+            <a:lvl1pPr marL="0" indent="0">
+              <a:defRPr sz="1100">
+                <a:solidFill>
+                  <a:schemeClr val="dk1"/>
+                </a:solidFill>
+                <a:latin typeface="+mn-lt"/>
+                <a:ea typeface="+mn-ea"/>
+                <a:cs typeface="+mn-cs"/>
+              </a:defRPr>
+            </a:lvl1pPr>
+            <a:lvl2pPr marL="457200" indent="0">
+              <a:defRPr sz="1100">
+                <a:solidFill>
+                  <a:schemeClr val="dk1"/>
+                </a:solidFill>
+                <a:latin typeface="+mn-lt"/>
+                <a:ea typeface="+mn-ea"/>
+                <a:cs typeface="+mn-cs"/>
+              </a:defRPr>
+            </a:lvl2pPr>
+            <a:lvl3pPr marL="914400" indent="0">
+              <a:defRPr sz="1100">
+                <a:solidFill>
+                  <a:schemeClr val="dk1"/>
+                </a:solidFill>
+                <a:latin typeface="+mn-lt"/>
+                <a:ea typeface="+mn-ea"/>
+                <a:cs typeface="+mn-cs"/>
+              </a:defRPr>
+            </a:lvl3pPr>
+            <a:lvl4pPr marL="1371600" indent="0">
+              <a:defRPr sz="1100">
+                <a:solidFill>
+                  <a:schemeClr val="dk1"/>
+                </a:solidFill>
+                <a:latin typeface="+mn-lt"/>
+                <a:ea typeface="+mn-ea"/>
+                <a:cs typeface="+mn-cs"/>
+              </a:defRPr>
+            </a:lvl4pPr>
+            <a:lvl5pPr marL="1828800" indent="0">
+              <a:defRPr sz="1100">
+                <a:solidFill>
+                  <a:schemeClr val="dk1"/>
+                </a:solidFill>
+                <a:latin typeface="+mn-lt"/>
+                <a:ea typeface="+mn-ea"/>
+                <a:cs typeface="+mn-cs"/>
+              </a:defRPr>
+            </a:lvl5pPr>
+            <a:lvl6pPr marL="2286000" indent="0">
+              <a:defRPr sz="1100">
+                <a:solidFill>
+                  <a:schemeClr val="dk1"/>
+                </a:solidFill>
+                <a:latin typeface="+mn-lt"/>
+                <a:ea typeface="+mn-ea"/>
+                <a:cs typeface="+mn-cs"/>
+              </a:defRPr>
+            </a:lvl6pPr>
+            <a:lvl7pPr marL="2743200" indent="0">
+              <a:defRPr sz="1100">
+                <a:solidFill>
+                  <a:schemeClr val="dk1"/>
+                </a:solidFill>
+                <a:latin typeface="+mn-lt"/>
+                <a:ea typeface="+mn-ea"/>
+                <a:cs typeface="+mn-cs"/>
+              </a:defRPr>
+            </a:lvl7pPr>
+            <a:lvl8pPr marL="3200400" indent="0">
+              <a:defRPr sz="1100">
+                <a:solidFill>
+                  <a:schemeClr val="dk1"/>
+                </a:solidFill>
+                <a:latin typeface="+mn-lt"/>
+                <a:ea typeface="+mn-ea"/>
+                <a:cs typeface="+mn-cs"/>
+              </a:defRPr>
+            </a:lvl8pPr>
+            <a:lvl9pPr marL="3657600" indent="0">
+              <a:defRPr sz="1100">
+                <a:solidFill>
+                  <a:schemeClr val="dk1"/>
+                </a:solidFill>
+                <a:latin typeface="+mn-lt"/>
+                <a:ea typeface="+mn-ea"/>
+                <a:cs typeface="+mn-cs"/>
+              </a:defRPr>
+            </a:lvl9pPr>
+          </a:lstStyle>
+          <a:p>
+            <a:pPr algn="ctr"/>
+            <a:r>
+              <a:rPr lang="en-US" dirty="0">
+                <a:solidFill>
+                  <a:schemeClr val="bg1"/>
+                </a:solidFill>
+              </a:rPr>
+              <a:t>INITIAL</a:t>
+            </a:r>
+            <a:r>
+              <a:rPr lang="en-US" baseline="0" dirty="0">
+                <a:solidFill>
+                  <a:schemeClr val="bg1"/>
+                </a:solidFill>
+              </a:rPr>
+              <a:t> STATION </a:t>
+            </a:r>
+            <a:r>
+              <a:rPr lang="en-US" dirty="0">
+                <a:solidFill>
+                  <a:schemeClr val="bg1"/>
+                </a:solidFill>
+              </a:rPr>
+              <a:t>DATA FETCH</a:t>
+            </a:r>
+          </a:p>
+        </p:txBody>
+      </p:sp>
+      <p:sp>
+        <p:nvSpPr>
+          <p:cNvPr id="52" name="Arrow: Left-Right 51">
+            <a:extLst>
+              <a:ext uri="{FF2B5EF4-FFF2-40B4-BE49-F238E27FC236}">
+                <a16:creationId xmlns:a16="http://schemas.microsoft.com/office/drawing/2014/main" id="{D7CD1405-134D-4476-A624-A522B5F5359B}"/>
+              </a:ext>
+            </a:extLst>
+          </p:cNvPr>
+          <p:cNvSpPr/>
+          <p:nvPr/>
+        </p:nvSpPr>
+        <p:spPr>
+          <a:xfrm>
+            <a:off x="6382104" y="1432895"/>
+            <a:ext cx="787106" cy="293423"/>
+          </a:xfrm>
+          <a:prstGeom prst="leftRightArrow">
+            <a:avLst/>
+          </a:prstGeom>
+        </p:spPr>
+        <p:style>
+          <a:lnRef idx="1">
+            <a:schemeClr val="accent3"/>
+          </a:lnRef>
+          <a:fillRef idx="2">
+            <a:schemeClr val="accent3"/>
+          </a:fillRef>
+          <a:effectRef idx="1">
+            <a:schemeClr val="accent3"/>
+          </a:effectRef>
+          <a:fontRef idx="minor">
+            <a:schemeClr val="dk1"/>
+          </a:fontRef>
+        </p:style>
+        <p:txBody>
+          <a:bodyPr rtlCol="0" anchor="ctr"/>
+          <a:lstStyle>
+            <a:lvl1pPr marL="0" indent="0">
+              <a:defRPr sz="1100">
+                <a:solidFill>
+                  <a:schemeClr val="lt1"/>
+                </a:solidFill>
+                <a:latin typeface="+mn-lt"/>
+                <a:ea typeface="+mn-ea"/>
+                <a:cs typeface="+mn-cs"/>
+              </a:defRPr>
+            </a:lvl1pPr>
+            <a:lvl2pPr marL="457200" indent="0">
+              <a:defRPr sz="1100">
+                <a:solidFill>
+                  <a:schemeClr val="lt1"/>
+                </a:solidFill>
+                <a:latin typeface="+mn-lt"/>
+                <a:ea typeface="+mn-ea"/>
+                <a:cs typeface="+mn-cs"/>
+              </a:defRPr>
+            </a:lvl2pPr>
+            <a:lvl3pPr marL="914400" indent="0">
+              <a:defRPr sz="1100">
+                <a:solidFill>
+                  <a:schemeClr val="lt1"/>
+                </a:solidFill>
+                <a:latin typeface="+mn-lt"/>
+                <a:ea typeface="+mn-ea"/>
+                <a:cs typeface="+mn-cs"/>
+              </a:defRPr>
+            </a:lvl3pPr>
+            <a:lvl4pPr marL="1371600" indent="0">
+              <a:defRPr sz="1100">
+                <a:solidFill>
+                  <a:schemeClr val="lt1"/>
+                </a:solidFill>
+                <a:latin typeface="+mn-lt"/>
+                <a:ea typeface="+mn-ea"/>
+                <a:cs typeface="+mn-cs"/>
+              </a:defRPr>
+            </a:lvl4pPr>
+            <a:lvl5pPr marL="1828800" indent="0">
+              <a:defRPr sz="1100">
+                <a:solidFill>
+                  <a:schemeClr val="lt1"/>
+                </a:solidFill>
+                <a:latin typeface="+mn-lt"/>
+                <a:ea typeface="+mn-ea"/>
+                <a:cs typeface="+mn-cs"/>
+              </a:defRPr>
+            </a:lvl5pPr>
+            <a:lvl6pPr marL="2286000" indent="0">
+              <a:defRPr sz="1100">
+                <a:solidFill>
+                  <a:schemeClr val="lt1"/>
+                </a:solidFill>
+                <a:latin typeface="+mn-lt"/>
+                <a:ea typeface="+mn-ea"/>
+                <a:cs typeface="+mn-cs"/>
+              </a:defRPr>
+            </a:lvl6pPr>
+            <a:lvl7pPr marL="2743200" indent="0">
+              <a:defRPr sz="1100">
+                <a:solidFill>
+                  <a:schemeClr val="lt1"/>
+                </a:solidFill>
+                <a:latin typeface="+mn-lt"/>
+                <a:ea typeface="+mn-ea"/>
+                <a:cs typeface="+mn-cs"/>
+              </a:defRPr>
+            </a:lvl7pPr>
+            <a:lvl8pPr marL="3200400" indent="0">
+              <a:defRPr sz="1100">
+                <a:solidFill>
+                  <a:schemeClr val="lt1"/>
+                </a:solidFill>
+                <a:latin typeface="+mn-lt"/>
+                <a:ea typeface="+mn-ea"/>
+                <a:cs typeface="+mn-cs"/>
+              </a:defRPr>
+            </a:lvl8pPr>
+            <a:lvl9pPr marL="3657600" indent="0">
+              <a:defRPr sz="1100">
+                <a:solidFill>
+                  <a:schemeClr val="lt1"/>
+                </a:solidFill>
+                <a:latin typeface="+mn-lt"/>
+                <a:ea typeface="+mn-ea"/>
+                <a:cs typeface="+mn-cs"/>
+              </a:defRPr>
+            </a:lvl9pPr>
+          </a:lstStyle>
+          <a:p>
+            <a:pPr algn="ctr"/>
+            <a:endParaRPr lang="en-US"/>
+          </a:p>
+        </p:txBody>
+      </p:sp>
+      <p:sp>
+        <p:nvSpPr>
+          <p:cNvPr id="53" name="Arrow: Left-Right 52">
+            <a:extLst>
+              <a:ext uri="{FF2B5EF4-FFF2-40B4-BE49-F238E27FC236}">
+                <a16:creationId xmlns:a16="http://schemas.microsoft.com/office/drawing/2014/main" id="{56CA0516-1835-498B-A334-03C38F75B959}"/>
+              </a:ext>
+            </a:extLst>
+          </p:cNvPr>
+          <p:cNvSpPr/>
+          <p:nvPr/>
+        </p:nvSpPr>
+        <p:spPr>
+          <a:xfrm>
+            <a:off x="6334335" y="2553143"/>
+            <a:ext cx="787106" cy="293423"/>
+          </a:xfrm>
+          <a:prstGeom prst="leftRightArrow">
+            <a:avLst/>
+          </a:prstGeom>
+        </p:spPr>
+        <p:style>
+          <a:lnRef idx="1">
+            <a:schemeClr val="accent3"/>
+          </a:lnRef>
+          <a:fillRef idx="2">
+            <a:schemeClr val="accent3"/>
+          </a:fillRef>
+          <a:effectRef idx="1">
+            <a:schemeClr val="accent3"/>
+          </a:effectRef>
+          <a:fontRef idx="minor">
+            <a:schemeClr val="dk1"/>
+          </a:fontRef>
+        </p:style>
+        <p:txBody>
+          <a:bodyPr rtlCol="0" anchor="ctr"/>
+          <a:lstStyle>
+            <a:lvl1pPr marL="0" indent="0">
+              <a:defRPr sz="1100">
+                <a:solidFill>
+                  <a:schemeClr val="lt1"/>
+                </a:solidFill>
+                <a:latin typeface="+mn-lt"/>
+                <a:ea typeface="+mn-ea"/>
+                <a:cs typeface="+mn-cs"/>
+              </a:defRPr>
+            </a:lvl1pPr>
+            <a:lvl2pPr marL="457200" indent="0">
+              <a:defRPr sz="1100">
+                <a:solidFill>
+                  <a:schemeClr val="lt1"/>
+                </a:solidFill>
+                <a:latin typeface="+mn-lt"/>
+                <a:ea typeface="+mn-ea"/>
+                <a:cs typeface="+mn-cs"/>
+              </a:defRPr>
+            </a:lvl2pPr>
+            <a:lvl3pPr marL="914400" indent="0">
+              <a:defRPr sz="1100">
+                <a:solidFill>
+                  <a:schemeClr val="lt1"/>
+                </a:solidFill>
+                <a:latin typeface="+mn-lt"/>
+                <a:ea typeface="+mn-ea"/>
+                <a:cs typeface="+mn-cs"/>
+              </a:defRPr>
+            </a:lvl3pPr>
+            <a:lvl4pPr marL="1371600" indent="0">
+              <a:defRPr sz="1100">
+                <a:solidFill>
+                  <a:schemeClr val="lt1"/>
+                </a:solidFill>
+                <a:latin typeface="+mn-lt"/>
+                <a:ea typeface="+mn-ea"/>
+                <a:cs typeface="+mn-cs"/>
+              </a:defRPr>
+            </a:lvl4pPr>
+            <a:lvl5pPr marL="1828800" indent="0">
+              <a:defRPr sz="1100">
+                <a:solidFill>
+                  <a:schemeClr val="lt1"/>
+                </a:solidFill>
+                <a:latin typeface="+mn-lt"/>
+                <a:ea typeface="+mn-ea"/>
+                <a:cs typeface="+mn-cs"/>
+              </a:defRPr>
+            </a:lvl5pPr>
+            <a:lvl6pPr marL="2286000" indent="0">
+              <a:defRPr sz="1100">
+                <a:solidFill>
+                  <a:schemeClr val="lt1"/>
+                </a:solidFill>
+                <a:latin typeface="+mn-lt"/>
+                <a:ea typeface="+mn-ea"/>
+                <a:cs typeface="+mn-cs"/>
+              </a:defRPr>
+            </a:lvl6pPr>
+            <a:lvl7pPr marL="2743200" indent="0">
+              <a:defRPr sz="1100">
+                <a:solidFill>
+                  <a:schemeClr val="lt1"/>
+                </a:solidFill>
+                <a:latin typeface="+mn-lt"/>
+                <a:ea typeface="+mn-ea"/>
+                <a:cs typeface="+mn-cs"/>
+              </a:defRPr>
+            </a:lvl7pPr>
+            <a:lvl8pPr marL="3200400" indent="0">
+              <a:defRPr sz="1100">
+                <a:solidFill>
+                  <a:schemeClr val="lt1"/>
+                </a:solidFill>
+                <a:latin typeface="+mn-lt"/>
+                <a:ea typeface="+mn-ea"/>
+                <a:cs typeface="+mn-cs"/>
+              </a:defRPr>
+            </a:lvl8pPr>
+            <a:lvl9pPr marL="3657600" indent="0">
+              <a:defRPr sz="1100">
+                <a:solidFill>
+                  <a:schemeClr val="lt1"/>
+                </a:solidFill>
+                <a:latin typeface="+mn-lt"/>
+                <a:ea typeface="+mn-ea"/>
+                <a:cs typeface="+mn-cs"/>
+              </a:defRPr>
+            </a:lvl9pPr>
+          </a:lstStyle>
+          <a:p>
+            <a:pPr algn="ctr"/>
+            <a:endParaRPr lang="en-US"/>
+          </a:p>
+        </p:txBody>
+      </p:sp>
+      <p:sp>
+        <p:nvSpPr>
+          <p:cNvPr id="54" name="TextBox 21">
+            <a:extLst>
+              <a:ext uri="{FF2B5EF4-FFF2-40B4-BE49-F238E27FC236}">
+                <a16:creationId xmlns:a16="http://schemas.microsoft.com/office/drawing/2014/main" id="{81C3F8FC-8D0D-47E6-BB39-A18D4FE46D61}"/>
+              </a:ext>
+            </a:extLst>
+          </p:cNvPr>
+          <p:cNvSpPr txBox="1"/>
+          <p:nvPr/>
+        </p:nvSpPr>
+        <p:spPr>
+          <a:xfrm>
+            <a:off x="7303548" y="1158719"/>
+            <a:ext cx="1080162" cy="1901191"/>
+          </a:xfrm>
+          <a:prstGeom prst="rect">
+            <a:avLst/>
+          </a:prstGeom>
+          <a:ln/>
+        </p:spPr>
+        <p:style>
+          <a:lnRef idx="1">
+            <a:schemeClr val="accent1"/>
+          </a:lnRef>
+          <a:fillRef idx="3">
+            <a:schemeClr val="accent1"/>
+          </a:fillRef>
+          <a:effectRef idx="2">
+            <a:schemeClr val="accent1"/>
+          </a:effectRef>
+          <a:fontRef idx="minor">
+            <a:schemeClr val="lt1"/>
+          </a:fontRef>
+        </p:style>
+        <p:txBody>
+          <a:bodyPr wrap="square" rtlCol="0" anchor="ctr"/>
+          <a:lstStyle>
+            <a:lvl1pPr marL="0" indent="0">
+              <a:defRPr sz="1100">
+                <a:solidFill>
+                  <a:schemeClr val="dk1"/>
+                </a:solidFill>
+                <a:latin typeface="+mn-lt"/>
+                <a:ea typeface="+mn-ea"/>
+                <a:cs typeface="+mn-cs"/>
+              </a:defRPr>
+            </a:lvl1pPr>
+            <a:lvl2pPr marL="457200" indent="0">
+              <a:defRPr sz="1100">
+                <a:solidFill>
+                  <a:schemeClr val="dk1"/>
+                </a:solidFill>
+                <a:latin typeface="+mn-lt"/>
+                <a:ea typeface="+mn-ea"/>
+                <a:cs typeface="+mn-cs"/>
+              </a:defRPr>
+            </a:lvl2pPr>
+            <a:lvl3pPr marL="914400" indent="0">
+              <a:defRPr sz="1100">
+                <a:solidFill>
+                  <a:schemeClr val="dk1"/>
+                </a:solidFill>
+                <a:latin typeface="+mn-lt"/>
+                <a:ea typeface="+mn-ea"/>
+                <a:cs typeface="+mn-cs"/>
+              </a:defRPr>
+            </a:lvl3pPr>
+            <a:lvl4pPr marL="1371600" indent="0">
+              <a:defRPr sz="1100">
+                <a:solidFill>
+                  <a:schemeClr val="dk1"/>
+                </a:solidFill>
+                <a:latin typeface="+mn-lt"/>
+                <a:ea typeface="+mn-ea"/>
+                <a:cs typeface="+mn-cs"/>
+              </a:defRPr>
+            </a:lvl4pPr>
+            <a:lvl5pPr marL="1828800" indent="0">
+              <a:defRPr sz="1100">
+                <a:solidFill>
+                  <a:schemeClr val="dk1"/>
+                </a:solidFill>
+                <a:latin typeface="+mn-lt"/>
+                <a:ea typeface="+mn-ea"/>
+                <a:cs typeface="+mn-cs"/>
+              </a:defRPr>
+            </a:lvl5pPr>
+            <a:lvl6pPr marL="2286000" indent="0">
+              <a:defRPr sz="1100">
+                <a:solidFill>
+                  <a:schemeClr val="dk1"/>
+                </a:solidFill>
+                <a:latin typeface="+mn-lt"/>
+                <a:ea typeface="+mn-ea"/>
+                <a:cs typeface="+mn-cs"/>
+              </a:defRPr>
+            </a:lvl6pPr>
+            <a:lvl7pPr marL="2743200" indent="0">
+              <a:defRPr sz="1100">
+                <a:solidFill>
+                  <a:schemeClr val="dk1"/>
+                </a:solidFill>
+                <a:latin typeface="+mn-lt"/>
+                <a:ea typeface="+mn-ea"/>
+                <a:cs typeface="+mn-cs"/>
+              </a:defRPr>
+            </a:lvl7pPr>
+            <a:lvl8pPr marL="3200400" indent="0">
+              <a:defRPr sz="1100">
+                <a:solidFill>
+                  <a:schemeClr val="dk1"/>
+                </a:solidFill>
+                <a:latin typeface="+mn-lt"/>
+                <a:ea typeface="+mn-ea"/>
+                <a:cs typeface="+mn-cs"/>
+              </a:defRPr>
+            </a:lvl8pPr>
+            <a:lvl9pPr marL="3657600" indent="0">
+              <a:defRPr sz="1100">
+                <a:solidFill>
+                  <a:schemeClr val="dk1"/>
+                </a:solidFill>
+                <a:latin typeface="+mn-lt"/>
+                <a:ea typeface="+mn-ea"/>
+                <a:cs typeface="+mn-cs"/>
+              </a:defRPr>
+            </a:lvl9pPr>
+          </a:lstStyle>
+          <a:p>
+            <a:pPr algn="ctr"/>
+            <a:r>
+              <a:rPr lang="en-US" dirty="0">
+                <a:solidFill>
+                  <a:schemeClr val="bg1"/>
+                </a:solidFill>
+              </a:rPr>
+              <a:t>DATABASE</a:t>
+            </a:r>
+            <a:r>
+              <a:rPr lang="en-US" baseline="0" dirty="0">
+                <a:solidFill>
+                  <a:schemeClr val="bg1"/>
+                </a:solidFill>
+              </a:rPr>
+              <a:t> CONNECTION MICROSERVICE</a:t>
+            </a:r>
+            <a:endParaRPr lang="en-US" dirty="0">
+              <a:solidFill>
+                <a:schemeClr val="bg1"/>
+              </a:solidFill>
+            </a:endParaRPr>
+          </a:p>
+        </p:txBody>
+      </p:sp>
+      <p:sp>
+        <p:nvSpPr>
+          <p:cNvPr id="55" name="Arrow: Left-Right 54">
+            <a:extLst>
+              <a:ext uri="{FF2B5EF4-FFF2-40B4-BE49-F238E27FC236}">
+                <a16:creationId xmlns:a16="http://schemas.microsoft.com/office/drawing/2014/main" id="{91C0D14B-B131-4AC7-AFAC-10E0A9A91B11}"/>
+              </a:ext>
+            </a:extLst>
+          </p:cNvPr>
+          <p:cNvSpPr/>
+          <p:nvPr/>
+        </p:nvSpPr>
+        <p:spPr>
+          <a:xfrm>
+            <a:off x="8614098" y="1936177"/>
+            <a:ext cx="787106" cy="294103"/>
+          </a:xfrm>
+          <a:prstGeom prst="leftRightArrow">
+            <a:avLst/>
+          </a:prstGeom>
+        </p:spPr>
+        <p:style>
+          <a:lnRef idx="1">
+            <a:schemeClr val="accent3"/>
+          </a:lnRef>
+          <a:fillRef idx="2">
+            <a:schemeClr val="accent3"/>
+          </a:fillRef>
+          <a:effectRef idx="1">
+            <a:schemeClr val="accent3"/>
+          </a:effectRef>
+          <a:fontRef idx="minor">
+            <a:schemeClr val="dk1"/>
+          </a:fontRef>
+        </p:style>
+        <p:txBody>
+          <a:bodyPr rtlCol="0" anchor="ctr"/>
+          <a:lstStyle>
+            <a:lvl1pPr marL="0" indent="0">
+              <a:defRPr sz="1100">
+                <a:solidFill>
+                  <a:schemeClr val="lt1"/>
+                </a:solidFill>
+                <a:latin typeface="+mn-lt"/>
+                <a:ea typeface="+mn-ea"/>
+                <a:cs typeface="+mn-cs"/>
+              </a:defRPr>
+            </a:lvl1pPr>
+            <a:lvl2pPr marL="457200" indent="0">
+              <a:defRPr sz="1100">
+                <a:solidFill>
+                  <a:schemeClr val="lt1"/>
+                </a:solidFill>
+                <a:latin typeface="+mn-lt"/>
+                <a:ea typeface="+mn-ea"/>
+                <a:cs typeface="+mn-cs"/>
+              </a:defRPr>
+            </a:lvl2pPr>
+            <a:lvl3pPr marL="914400" indent="0">
+              <a:defRPr sz="1100">
+                <a:solidFill>
+                  <a:schemeClr val="lt1"/>
+                </a:solidFill>
+                <a:latin typeface="+mn-lt"/>
+                <a:ea typeface="+mn-ea"/>
+                <a:cs typeface="+mn-cs"/>
+              </a:defRPr>
+            </a:lvl3pPr>
+            <a:lvl4pPr marL="1371600" indent="0">
+              <a:defRPr sz="1100">
+                <a:solidFill>
+                  <a:schemeClr val="lt1"/>
+                </a:solidFill>
+                <a:latin typeface="+mn-lt"/>
+                <a:ea typeface="+mn-ea"/>
+                <a:cs typeface="+mn-cs"/>
+              </a:defRPr>
+            </a:lvl4pPr>
+            <a:lvl5pPr marL="1828800" indent="0">
+              <a:defRPr sz="1100">
+                <a:solidFill>
+                  <a:schemeClr val="lt1"/>
+                </a:solidFill>
+                <a:latin typeface="+mn-lt"/>
+                <a:ea typeface="+mn-ea"/>
+                <a:cs typeface="+mn-cs"/>
+              </a:defRPr>
+            </a:lvl5pPr>
+            <a:lvl6pPr marL="2286000" indent="0">
+              <a:defRPr sz="1100">
+                <a:solidFill>
+                  <a:schemeClr val="lt1"/>
+                </a:solidFill>
+                <a:latin typeface="+mn-lt"/>
+                <a:ea typeface="+mn-ea"/>
+                <a:cs typeface="+mn-cs"/>
+              </a:defRPr>
+            </a:lvl6pPr>
+            <a:lvl7pPr marL="2743200" indent="0">
+              <a:defRPr sz="1100">
+                <a:solidFill>
+                  <a:schemeClr val="lt1"/>
+                </a:solidFill>
+                <a:latin typeface="+mn-lt"/>
+                <a:ea typeface="+mn-ea"/>
+                <a:cs typeface="+mn-cs"/>
+              </a:defRPr>
+            </a:lvl7pPr>
+            <a:lvl8pPr marL="3200400" indent="0">
+              <a:defRPr sz="1100">
+                <a:solidFill>
+                  <a:schemeClr val="lt1"/>
+                </a:solidFill>
+                <a:latin typeface="+mn-lt"/>
+                <a:ea typeface="+mn-ea"/>
+                <a:cs typeface="+mn-cs"/>
+              </a:defRPr>
+            </a:lvl8pPr>
+            <a:lvl9pPr marL="3657600" indent="0">
+              <a:defRPr sz="1100">
+                <a:solidFill>
+                  <a:schemeClr val="lt1"/>
+                </a:solidFill>
+                <a:latin typeface="+mn-lt"/>
+                <a:ea typeface="+mn-ea"/>
+                <a:cs typeface="+mn-cs"/>
+              </a:defRPr>
+            </a:lvl9pPr>
+          </a:lstStyle>
+          <a:p>
+            <a:pPr algn="ctr"/>
+            <a:endParaRPr lang="en-US"/>
+          </a:p>
+        </p:txBody>
+      </p:sp>
+      <p:sp>
+        <p:nvSpPr>
+          <p:cNvPr id="57" name="Arrow: Left-Right 56">
+            <a:extLst>
+              <a:ext uri="{FF2B5EF4-FFF2-40B4-BE49-F238E27FC236}">
+                <a16:creationId xmlns:a16="http://schemas.microsoft.com/office/drawing/2014/main" id="{130B2677-8F82-4D09-9B3F-9AD7E9AE32DE}"/>
+              </a:ext>
+            </a:extLst>
+          </p:cNvPr>
+          <p:cNvSpPr/>
+          <p:nvPr/>
+        </p:nvSpPr>
+        <p:spPr>
+          <a:xfrm>
+            <a:off x="6382104" y="4644571"/>
+            <a:ext cx="787106" cy="293423"/>
+          </a:xfrm>
+          <a:prstGeom prst="leftRightArrow">
+            <a:avLst/>
+          </a:prstGeom>
+        </p:spPr>
+        <p:style>
+          <a:lnRef idx="1">
+            <a:schemeClr val="accent3"/>
+          </a:lnRef>
+          <a:fillRef idx="2">
+            <a:schemeClr val="accent3"/>
+          </a:fillRef>
+          <a:effectRef idx="1">
+            <a:schemeClr val="accent3"/>
+          </a:effectRef>
+          <a:fontRef idx="minor">
+            <a:schemeClr val="dk1"/>
+          </a:fontRef>
+        </p:style>
+        <p:txBody>
+          <a:bodyPr rtlCol="0" anchor="ctr"/>
+          <a:lstStyle>
+            <a:lvl1pPr marL="0" indent="0">
+              <a:defRPr sz="1100">
+                <a:solidFill>
+                  <a:schemeClr val="lt1"/>
+                </a:solidFill>
+                <a:latin typeface="+mn-lt"/>
+                <a:ea typeface="+mn-ea"/>
+                <a:cs typeface="+mn-cs"/>
+              </a:defRPr>
+            </a:lvl1pPr>
+            <a:lvl2pPr marL="457200" indent="0">
+              <a:defRPr sz="1100">
+                <a:solidFill>
+                  <a:schemeClr val="lt1"/>
+                </a:solidFill>
+                <a:latin typeface="+mn-lt"/>
+                <a:ea typeface="+mn-ea"/>
+                <a:cs typeface="+mn-cs"/>
+              </a:defRPr>
+            </a:lvl2pPr>
+            <a:lvl3pPr marL="914400" indent="0">
+              <a:defRPr sz="1100">
+                <a:solidFill>
+                  <a:schemeClr val="lt1"/>
+                </a:solidFill>
+                <a:latin typeface="+mn-lt"/>
+                <a:ea typeface="+mn-ea"/>
+                <a:cs typeface="+mn-cs"/>
+              </a:defRPr>
+            </a:lvl3pPr>
+            <a:lvl4pPr marL="1371600" indent="0">
+              <a:defRPr sz="1100">
+                <a:solidFill>
+                  <a:schemeClr val="lt1"/>
+                </a:solidFill>
+                <a:latin typeface="+mn-lt"/>
+                <a:ea typeface="+mn-ea"/>
+                <a:cs typeface="+mn-cs"/>
+              </a:defRPr>
+            </a:lvl4pPr>
+            <a:lvl5pPr marL="1828800" indent="0">
+              <a:defRPr sz="1100">
+                <a:solidFill>
+                  <a:schemeClr val="lt1"/>
+                </a:solidFill>
+                <a:latin typeface="+mn-lt"/>
+                <a:ea typeface="+mn-ea"/>
+                <a:cs typeface="+mn-cs"/>
+              </a:defRPr>
+            </a:lvl5pPr>
+            <a:lvl6pPr marL="2286000" indent="0">
+              <a:defRPr sz="1100">
+                <a:solidFill>
+                  <a:schemeClr val="lt1"/>
+                </a:solidFill>
+                <a:latin typeface="+mn-lt"/>
+                <a:ea typeface="+mn-ea"/>
+                <a:cs typeface="+mn-cs"/>
+              </a:defRPr>
+            </a:lvl6pPr>
+            <a:lvl7pPr marL="2743200" indent="0">
+              <a:defRPr sz="1100">
+                <a:solidFill>
+                  <a:schemeClr val="lt1"/>
+                </a:solidFill>
+                <a:latin typeface="+mn-lt"/>
+                <a:ea typeface="+mn-ea"/>
+                <a:cs typeface="+mn-cs"/>
+              </a:defRPr>
+            </a:lvl7pPr>
+            <a:lvl8pPr marL="3200400" indent="0">
+              <a:defRPr sz="1100">
+                <a:solidFill>
+                  <a:schemeClr val="lt1"/>
+                </a:solidFill>
+                <a:latin typeface="+mn-lt"/>
+                <a:ea typeface="+mn-ea"/>
+                <a:cs typeface="+mn-cs"/>
+              </a:defRPr>
+            </a:lvl8pPr>
+            <a:lvl9pPr marL="3657600" indent="0">
+              <a:defRPr sz="1100">
+                <a:solidFill>
+                  <a:schemeClr val="lt1"/>
+                </a:solidFill>
+                <a:latin typeface="+mn-lt"/>
+                <a:ea typeface="+mn-ea"/>
+                <a:cs typeface="+mn-cs"/>
+              </a:defRPr>
+            </a:lvl9pPr>
+          </a:lstStyle>
+          <a:p>
+            <a:pPr algn="ctr"/>
+            <a:endParaRPr lang="en-US"/>
+          </a:p>
+        </p:txBody>
+      </p:sp>
+      <p:sp>
+        <p:nvSpPr>
+          <p:cNvPr id="59" name="Arrow: Left-Right 58">
+            <a:extLst>
+              <a:ext uri="{FF2B5EF4-FFF2-40B4-BE49-F238E27FC236}">
+                <a16:creationId xmlns:a16="http://schemas.microsoft.com/office/drawing/2014/main" id="{70CD70C6-CBA1-4B4C-BC05-E2A214CBFAA0}"/>
+              </a:ext>
+            </a:extLst>
+          </p:cNvPr>
+          <p:cNvSpPr/>
+          <p:nvPr/>
+        </p:nvSpPr>
+        <p:spPr>
+          <a:xfrm rot="1567692">
+            <a:off x="6406497" y="4040026"/>
+            <a:ext cx="787106" cy="293423"/>
+          </a:xfrm>
+          <a:prstGeom prst="leftRightArrow">
+            <a:avLst/>
+          </a:prstGeom>
+        </p:spPr>
+        <p:style>
+          <a:lnRef idx="1">
+            <a:schemeClr val="accent3"/>
+          </a:lnRef>
+          <a:fillRef idx="2">
+            <a:schemeClr val="accent3"/>
+          </a:fillRef>
+          <a:effectRef idx="1">
+            <a:schemeClr val="accent3"/>
+          </a:effectRef>
+          <a:fontRef idx="minor">
+            <a:schemeClr val="dk1"/>
+          </a:fontRef>
+        </p:style>
+        <p:txBody>
+          <a:bodyPr rtlCol="0" anchor="ctr"/>
+          <a:lstStyle>
+            <a:lvl1pPr marL="0" indent="0">
+              <a:defRPr sz="1100">
+                <a:solidFill>
+                  <a:schemeClr val="lt1"/>
+                </a:solidFill>
+                <a:latin typeface="+mn-lt"/>
+                <a:ea typeface="+mn-ea"/>
+                <a:cs typeface="+mn-cs"/>
+              </a:defRPr>
+            </a:lvl1pPr>
+            <a:lvl2pPr marL="457200" indent="0">
+              <a:defRPr sz="1100">
+                <a:solidFill>
+                  <a:schemeClr val="lt1"/>
+                </a:solidFill>
+                <a:latin typeface="+mn-lt"/>
+                <a:ea typeface="+mn-ea"/>
+                <a:cs typeface="+mn-cs"/>
+              </a:defRPr>
+            </a:lvl2pPr>
+            <a:lvl3pPr marL="914400" indent="0">
+              <a:defRPr sz="1100">
+                <a:solidFill>
+                  <a:schemeClr val="lt1"/>
+                </a:solidFill>
+                <a:latin typeface="+mn-lt"/>
+                <a:ea typeface="+mn-ea"/>
+                <a:cs typeface="+mn-cs"/>
+              </a:defRPr>
+            </a:lvl3pPr>
+            <a:lvl4pPr marL="1371600" indent="0">
+              <a:defRPr sz="1100">
+                <a:solidFill>
+                  <a:schemeClr val="lt1"/>
+                </a:solidFill>
+                <a:latin typeface="+mn-lt"/>
+                <a:ea typeface="+mn-ea"/>
+                <a:cs typeface="+mn-cs"/>
+              </a:defRPr>
+            </a:lvl4pPr>
+            <a:lvl5pPr marL="1828800" indent="0">
+              <a:defRPr sz="1100">
+                <a:solidFill>
+                  <a:schemeClr val="lt1"/>
+                </a:solidFill>
+                <a:latin typeface="+mn-lt"/>
+                <a:ea typeface="+mn-ea"/>
+                <a:cs typeface="+mn-cs"/>
+              </a:defRPr>
+            </a:lvl5pPr>
+            <a:lvl6pPr marL="2286000" indent="0">
+              <a:defRPr sz="1100">
+                <a:solidFill>
+                  <a:schemeClr val="lt1"/>
+                </a:solidFill>
+                <a:latin typeface="+mn-lt"/>
+                <a:ea typeface="+mn-ea"/>
+                <a:cs typeface="+mn-cs"/>
+              </a:defRPr>
+            </a:lvl6pPr>
+            <a:lvl7pPr marL="2743200" indent="0">
+              <a:defRPr sz="1100">
+                <a:solidFill>
+                  <a:schemeClr val="lt1"/>
+                </a:solidFill>
+                <a:latin typeface="+mn-lt"/>
+                <a:ea typeface="+mn-ea"/>
+                <a:cs typeface="+mn-cs"/>
+              </a:defRPr>
+            </a:lvl7pPr>
+            <a:lvl8pPr marL="3200400" indent="0">
+              <a:defRPr sz="1100">
+                <a:solidFill>
+                  <a:schemeClr val="lt1"/>
+                </a:solidFill>
+                <a:latin typeface="+mn-lt"/>
+                <a:ea typeface="+mn-ea"/>
+                <a:cs typeface="+mn-cs"/>
+              </a:defRPr>
+            </a:lvl8pPr>
+            <a:lvl9pPr marL="3657600" indent="0">
+              <a:defRPr sz="1100">
+                <a:solidFill>
+                  <a:schemeClr val="lt1"/>
+                </a:solidFill>
+                <a:latin typeface="+mn-lt"/>
+                <a:ea typeface="+mn-ea"/>
+                <a:cs typeface="+mn-cs"/>
+              </a:defRPr>
+            </a:lvl9pPr>
+          </a:lstStyle>
+          <a:p>
+            <a:pPr algn="ctr"/>
+            <a:endParaRPr lang="en-US"/>
+          </a:p>
+        </p:txBody>
+      </p:sp>
+      <p:pic>
+        <p:nvPicPr>
+          <p:cNvPr id="72" name="Picture 71" descr="Shape, circle&#10;&#10;Description automatically generated">
+            <a:extLst>
+              <a:ext uri="{FF2B5EF4-FFF2-40B4-BE49-F238E27FC236}">
+                <a16:creationId xmlns:a16="http://schemas.microsoft.com/office/drawing/2014/main" id="{33249914-5ED8-4999-9F48-667145A6D84E}"/>
+              </a:ext>
+            </a:extLst>
+          </p:cNvPr>
+          <p:cNvPicPr>
+            <a:picLocks noChangeAspect="1"/>
+          </p:cNvPicPr>
+          <p:nvPr/>
+        </p:nvPicPr>
+        <p:blipFill>
+          <a:blip r:embed="rId2">
+            <a:extLst>
+              <a:ext uri="{28A0092B-C50C-407E-A947-70E740481C1C}">
+                <a14:useLocalDpi xmlns:a14="http://schemas.microsoft.com/office/drawing/2010/main" val="0"/>
+              </a:ext>
+            </a:extLst>
+          </a:blip>
+          <a:stretch>
+            <a:fillRect/>
+          </a:stretch>
+        </p:blipFill>
+        <p:spPr>
+          <a:xfrm>
+            <a:off x="9563518" y="1602423"/>
+            <a:ext cx="685733" cy="782089"/>
+          </a:xfrm>
+          <a:prstGeom prst="roundRect">
+            <a:avLst>
+              <a:gd name="adj" fmla="val 16667"/>
+            </a:avLst>
+          </a:prstGeom>
+          <a:ln>
+            <a:noFill/>
+          </a:ln>
+          <a:effectLst>
+            <a:outerShdw blurRad="76200" dist="38100" dir="7800000" algn="tl" rotWithShape="0">
+              <a:srgbClr val="000000">
+                <a:alpha val="40000"/>
+              </a:srgbClr>
+            </a:outerShdw>
+          </a:effectLst>
+          <a:scene3d>
+            <a:camera prst="orthographicFront"/>
+            <a:lightRig rig="contrasting" dir="t">
+              <a:rot lat="0" lon="0" rev="4200000"/>
+            </a:lightRig>
+          </a:scene3d>
+          <a:sp3d prstMaterial="plastic">
+            <a:bevelT w="381000" h="114300" prst="relaxedInset"/>
+            <a:contourClr>
+              <a:srgbClr val="969696"/>
+            </a:contourClr>
+          </a:sp3d>
+        </p:spPr>
+      </p:pic>
+      <p:sp>
+        <p:nvSpPr>
+          <p:cNvPr id="73" name="TextBox 72">
+            <a:extLst>
+              <a:ext uri="{FF2B5EF4-FFF2-40B4-BE49-F238E27FC236}">
+                <a16:creationId xmlns:a16="http://schemas.microsoft.com/office/drawing/2014/main" id="{76D56FB4-E1B9-4CE1-B9B7-0027D7D1B249}"/>
+              </a:ext>
+            </a:extLst>
+          </p:cNvPr>
+          <p:cNvSpPr txBox="1"/>
+          <p:nvPr/>
+        </p:nvSpPr>
+        <p:spPr>
+          <a:xfrm>
+            <a:off x="9397533" y="2408814"/>
+            <a:ext cx="1031587" cy="400110"/>
+          </a:xfrm>
+          <a:prstGeom prst="rect">
+            <a:avLst/>
+          </a:prstGeom>
+          <a:noFill/>
+        </p:spPr>
+        <p:txBody>
+          <a:bodyPr wrap="square" rtlCol="0">
+            <a:spAutoFit/>
+          </a:bodyPr>
+          <a:lstStyle/>
+          <a:p>
+            <a:pPr algn="ctr"/>
+            <a:r>
+              <a:rPr lang="en-US" sz="1000" dirty="0"/>
+              <a:t>LOCAL</a:t>
+            </a:r>
+          </a:p>
+          <a:p>
+            <a:pPr algn="ctr"/>
+            <a:r>
+              <a:rPr lang="en-US" sz="1000" dirty="0"/>
+              <a:t>MONGODB</a:t>
+            </a:r>
+          </a:p>
+        </p:txBody>
+      </p:sp>
+      <p:pic>
+        <p:nvPicPr>
+          <p:cNvPr id="74" name="Graphic 73">
+            <a:extLst>
+              <a:ext uri="{FF2B5EF4-FFF2-40B4-BE49-F238E27FC236}">
+                <a16:creationId xmlns:a16="http://schemas.microsoft.com/office/drawing/2014/main" id="{CA454DBD-98FC-4788-B19C-65500536D418}"/>
+              </a:ext>
+            </a:extLst>
+          </p:cNvPr>
+          <p:cNvPicPr>
+            <a:picLocks noChangeAspect="1"/>
+          </p:cNvPicPr>
+          <p:nvPr/>
+        </p:nvPicPr>
+        <p:blipFill>
+          <a:blip r:embed="rId3">
+            <a:extLst>
+              <a:ext uri="{28A0092B-C50C-407E-A947-70E740481C1C}">
+                <a14:useLocalDpi xmlns:a14="http://schemas.microsoft.com/office/drawing/2010/main" val="0"/>
+              </a:ext>
+              <a:ext uri="{96DAC541-7B7A-43D3-8B79-37D633B846F1}">
+                <asvg:svgBlip xmlns:asvg="http://schemas.microsoft.com/office/drawing/2016/SVG/main" r:embed="rId4"/>
+              </a:ext>
+            </a:extLst>
+          </a:blip>
+          <a:stretch>
+            <a:fillRect/>
+          </a:stretch>
+        </p:blipFill>
+        <p:spPr>
+          <a:xfrm>
+            <a:off x="7472069" y="4160586"/>
+            <a:ext cx="743119" cy="817431"/>
+          </a:xfrm>
+          <a:prstGeom prst="rect">
+            <a:avLst/>
+          </a:prstGeom>
+        </p:spPr>
+      </p:pic>
+      <p:sp>
+        <p:nvSpPr>
+          <p:cNvPr id="75" name="TextBox 74">
+            <a:extLst>
+              <a:ext uri="{FF2B5EF4-FFF2-40B4-BE49-F238E27FC236}">
+                <a16:creationId xmlns:a16="http://schemas.microsoft.com/office/drawing/2014/main" id="{98373F4C-2AB7-4BE2-AD73-544AAC4B4721}"/>
+              </a:ext>
+            </a:extLst>
+          </p:cNvPr>
+          <p:cNvSpPr txBox="1"/>
+          <p:nvPr/>
+        </p:nvSpPr>
+        <p:spPr>
+          <a:xfrm>
+            <a:off x="7352123" y="4978017"/>
+            <a:ext cx="1031587" cy="246221"/>
+          </a:xfrm>
+          <a:prstGeom prst="rect">
+            <a:avLst/>
+          </a:prstGeom>
+          <a:noFill/>
+        </p:spPr>
+        <p:txBody>
+          <a:bodyPr wrap="square" rtlCol="0">
+            <a:spAutoFit/>
+          </a:bodyPr>
+          <a:lstStyle/>
+          <a:p>
+            <a:pPr algn="ctr"/>
+            <a:r>
+              <a:rPr lang="en-US" sz="1000" dirty="0"/>
+              <a:t>AWS S3</a:t>
+            </a:r>
+          </a:p>
+        </p:txBody>
+      </p:sp>
+      <p:pic>
+        <p:nvPicPr>
+          <p:cNvPr id="77" name="Picture 76" descr="Shape, circle&#10;&#10;Description automatically generated">
+            <a:extLst>
+              <a:ext uri="{FF2B5EF4-FFF2-40B4-BE49-F238E27FC236}">
+                <a16:creationId xmlns:a16="http://schemas.microsoft.com/office/drawing/2014/main" id="{09A66E75-C7CD-4D39-8685-2EBFC7824490}"/>
+              </a:ext>
+            </a:extLst>
+          </p:cNvPr>
+          <p:cNvPicPr>
+            <a:picLocks noChangeAspect="1"/>
+          </p:cNvPicPr>
+          <p:nvPr/>
+        </p:nvPicPr>
+        <p:blipFill>
+          <a:blip r:embed="rId5">
+            <a:extLst>
+              <a:ext uri="{28A0092B-C50C-407E-A947-70E740481C1C}">
+                <a14:useLocalDpi xmlns:a14="http://schemas.microsoft.com/office/drawing/2010/main" val="0"/>
+              </a:ext>
+            </a:extLst>
+          </a:blip>
+          <a:stretch>
+            <a:fillRect/>
+          </a:stretch>
+        </p:blipFill>
+        <p:spPr>
+          <a:xfrm>
+            <a:off x="9325708" y="5074953"/>
+            <a:ext cx="240883" cy="400110"/>
+          </a:xfrm>
+          <a:prstGeom prst="rect">
+            <a:avLst/>
+          </a:prstGeom>
+        </p:spPr>
+      </p:pic>
+      <p:sp>
+        <p:nvSpPr>
+          <p:cNvPr id="80" name="TextBox 79">
+            <a:extLst>
+              <a:ext uri="{FF2B5EF4-FFF2-40B4-BE49-F238E27FC236}">
+                <a16:creationId xmlns:a16="http://schemas.microsoft.com/office/drawing/2014/main" id="{12AD1932-3BC1-4487-816F-5920B805A129}"/>
+              </a:ext>
+            </a:extLst>
+          </p:cNvPr>
+          <p:cNvSpPr txBox="1"/>
+          <p:nvPr/>
+        </p:nvSpPr>
+        <p:spPr>
+          <a:xfrm>
+            <a:off x="9620555" y="5055522"/>
+            <a:ext cx="577454" cy="400110"/>
+          </a:xfrm>
+          <a:prstGeom prst="rect">
+            <a:avLst/>
+          </a:prstGeom>
+          <a:noFill/>
+        </p:spPr>
+        <p:txBody>
+          <a:bodyPr wrap="square" rtlCol="0">
+            <a:spAutoFit/>
+          </a:bodyPr>
+          <a:lstStyle/>
+          <a:p>
+            <a:pPr algn="ctr"/>
+            <a:r>
+              <a:rPr lang="en-US" sz="1000" dirty="0"/>
+              <a:t>Apache Kafka</a:t>
+            </a:r>
+          </a:p>
+        </p:txBody>
+      </p:sp>
+      <p:pic>
+        <p:nvPicPr>
+          <p:cNvPr id="82" name="Picture 81" descr="Shape, circle&#10;&#10;Description automatically generated">
+            <a:extLst>
+              <a:ext uri="{FF2B5EF4-FFF2-40B4-BE49-F238E27FC236}">
+                <a16:creationId xmlns:a16="http://schemas.microsoft.com/office/drawing/2014/main" id="{D8BBED55-F5D7-4EF6-984B-60FB7302AD25}"/>
+              </a:ext>
+            </a:extLst>
+          </p:cNvPr>
+          <p:cNvPicPr>
+            <a:picLocks noChangeAspect="1"/>
+          </p:cNvPicPr>
+          <p:nvPr/>
+        </p:nvPicPr>
+        <p:blipFill>
+          <a:blip r:embed="rId5">
+            <a:extLst>
+              <a:ext uri="{28A0092B-C50C-407E-A947-70E740481C1C}">
+                <a14:useLocalDpi xmlns:a14="http://schemas.microsoft.com/office/drawing/2010/main" val="0"/>
+              </a:ext>
+            </a:extLst>
+          </a:blip>
+          <a:stretch>
+            <a:fillRect/>
+          </a:stretch>
+        </p:blipFill>
+        <p:spPr>
+          <a:xfrm>
+            <a:off x="6800050" y="3802021"/>
+            <a:ext cx="175078" cy="290807"/>
+          </a:xfrm>
+          <a:prstGeom prst="rect">
+            <a:avLst/>
+          </a:prstGeom>
+        </p:spPr>
+      </p:pic>
+      <p:pic>
+        <p:nvPicPr>
+          <p:cNvPr id="83" name="Picture 82" descr="Shape, circle&#10;&#10;Description automatically generated">
+            <a:extLst>
+              <a:ext uri="{FF2B5EF4-FFF2-40B4-BE49-F238E27FC236}">
+                <a16:creationId xmlns:a16="http://schemas.microsoft.com/office/drawing/2014/main" id="{93329848-4831-47BB-A481-965BBF26559F}"/>
+              </a:ext>
+            </a:extLst>
+          </p:cNvPr>
+          <p:cNvPicPr>
+            <a:picLocks noChangeAspect="1"/>
+          </p:cNvPicPr>
+          <p:nvPr/>
+        </p:nvPicPr>
+        <p:blipFill>
+          <a:blip r:embed="rId5">
+            <a:extLst>
+              <a:ext uri="{28A0092B-C50C-407E-A947-70E740481C1C}">
+                <a14:useLocalDpi xmlns:a14="http://schemas.microsoft.com/office/drawing/2010/main" val="0"/>
+              </a:ext>
+            </a:extLst>
+          </a:blip>
+          <a:stretch>
+            <a:fillRect/>
+          </a:stretch>
+        </p:blipFill>
+        <p:spPr>
+          <a:xfrm>
+            <a:off x="6727888" y="4873656"/>
+            <a:ext cx="175078" cy="290807"/>
+          </a:xfrm>
+          <a:prstGeom prst="rect">
+            <a:avLst/>
+          </a:prstGeom>
+        </p:spPr>
+      </p:pic>
+      <p:pic>
+        <p:nvPicPr>
+          <p:cNvPr id="86" name="Picture 85" descr="Shape, circle&#10;&#10;Description automatically generated">
+            <a:extLst>
+              <a:ext uri="{FF2B5EF4-FFF2-40B4-BE49-F238E27FC236}">
+                <a16:creationId xmlns:a16="http://schemas.microsoft.com/office/drawing/2014/main" id="{37F53E18-9260-42E5-B641-F5CF6A414EEA}"/>
+              </a:ext>
+            </a:extLst>
+          </p:cNvPr>
+          <p:cNvPicPr>
+            <a:picLocks noChangeAspect="1"/>
+          </p:cNvPicPr>
+          <p:nvPr/>
+        </p:nvPicPr>
+        <p:blipFill>
+          <a:blip r:embed="rId5">
+            <a:extLst>
+              <a:ext uri="{28A0092B-C50C-407E-A947-70E740481C1C}">
+                <a14:useLocalDpi xmlns:a14="http://schemas.microsoft.com/office/drawing/2010/main" val="0"/>
+              </a:ext>
+            </a:extLst>
+          </a:blip>
+          <a:stretch>
+            <a:fillRect/>
+          </a:stretch>
+        </p:blipFill>
+        <p:spPr>
+          <a:xfrm>
+            <a:off x="4111728" y="3656617"/>
+            <a:ext cx="175078" cy="290807"/>
+          </a:xfrm>
+          <a:prstGeom prst="rect">
+            <a:avLst/>
+          </a:prstGeom>
+        </p:spPr>
+      </p:pic>
+      <p:pic>
+        <p:nvPicPr>
+          <p:cNvPr id="87" name="Picture 86" descr="Shape, circle&#10;&#10;Description automatically generated">
+            <a:extLst>
+              <a:ext uri="{FF2B5EF4-FFF2-40B4-BE49-F238E27FC236}">
+                <a16:creationId xmlns:a16="http://schemas.microsoft.com/office/drawing/2014/main" id="{B2C48F03-C7E8-491C-8832-B2E2EF3E120F}"/>
+              </a:ext>
+            </a:extLst>
+          </p:cNvPr>
+          <p:cNvPicPr>
+            <a:picLocks noChangeAspect="1"/>
+          </p:cNvPicPr>
+          <p:nvPr/>
+        </p:nvPicPr>
+        <p:blipFill>
+          <a:blip r:embed="rId5">
+            <a:extLst>
+              <a:ext uri="{28A0092B-C50C-407E-A947-70E740481C1C}">
+                <a14:useLocalDpi xmlns:a14="http://schemas.microsoft.com/office/drawing/2010/main" val="0"/>
+              </a:ext>
+            </a:extLst>
+          </a:blip>
+          <a:stretch>
+            <a:fillRect/>
+          </a:stretch>
+        </p:blipFill>
+        <p:spPr>
+          <a:xfrm>
+            <a:off x="4126472" y="4343003"/>
+            <a:ext cx="175078" cy="290807"/>
+          </a:xfrm>
+          <a:prstGeom prst="rect">
+            <a:avLst/>
+          </a:prstGeom>
+        </p:spPr>
+      </p:pic>
+      <p:sp>
+        <p:nvSpPr>
+          <p:cNvPr id="91" name="Arrow: Left-Right 90">
+            <a:extLst>
+              <a:ext uri="{FF2B5EF4-FFF2-40B4-BE49-F238E27FC236}">
+                <a16:creationId xmlns:a16="http://schemas.microsoft.com/office/drawing/2014/main" id="{63C1E1A7-7873-4C73-927F-2048DB9E7A3E}"/>
+              </a:ext>
+            </a:extLst>
+          </p:cNvPr>
+          <p:cNvSpPr/>
+          <p:nvPr/>
+        </p:nvSpPr>
+        <p:spPr>
+          <a:xfrm>
+            <a:off x="1403107" y="3282287"/>
+            <a:ext cx="787106" cy="293423"/>
+          </a:xfrm>
+          <a:prstGeom prst="leftRightArrow">
+            <a:avLst/>
+          </a:prstGeom>
+        </p:spPr>
+        <p:style>
+          <a:lnRef idx="1">
+            <a:schemeClr val="accent3"/>
+          </a:lnRef>
+          <a:fillRef idx="2">
+            <a:schemeClr val="accent3"/>
+          </a:fillRef>
+          <a:effectRef idx="1">
+            <a:schemeClr val="accent3"/>
+          </a:effectRef>
+          <a:fontRef idx="minor">
+            <a:schemeClr val="dk1"/>
+          </a:fontRef>
+        </p:style>
+        <p:txBody>
+          <a:bodyPr rtlCol="0" anchor="ctr"/>
+          <a:lstStyle>
+            <a:lvl1pPr marL="0" indent="0">
+              <a:defRPr sz="1100">
+                <a:solidFill>
+                  <a:schemeClr val="lt1"/>
+                </a:solidFill>
+                <a:latin typeface="+mn-lt"/>
+                <a:ea typeface="+mn-ea"/>
+                <a:cs typeface="+mn-cs"/>
+              </a:defRPr>
+            </a:lvl1pPr>
+            <a:lvl2pPr marL="457200" indent="0">
+              <a:defRPr sz="1100">
+                <a:solidFill>
+                  <a:schemeClr val="lt1"/>
+                </a:solidFill>
+                <a:latin typeface="+mn-lt"/>
+                <a:ea typeface="+mn-ea"/>
+                <a:cs typeface="+mn-cs"/>
+              </a:defRPr>
+            </a:lvl2pPr>
+            <a:lvl3pPr marL="914400" indent="0">
+              <a:defRPr sz="1100">
+                <a:solidFill>
+                  <a:schemeClr val="lt1"/>
+                </a:solidFill>
+                <a:latin typeface="+mn-lt"/>
+                <a:ea typeface="+mn-ea"/>
+                <a:cs typeface="+mn-cs"/>
+              </a:defRPr>
+            </a:lvl3pPr>
+            <a:lvl4pPr marL="1371600" indent="0">
+              <a:defRPr sz="1100">
+                <a:solidFill>
+                  <a:schemeClr val="lt1"/>
+                </a:solidFill>
+                <a:latin typeface="+mn-lt"/>
+                <a:ea typeface="+mn-ea"/>
+                <a:cs typeface="+mn-cs"/>
+              </a:defRPr>
+            </a:lvl4pPr>
+            <a:lvl5pPr marL="1828800" indent="0">
+              <a:defRPr sz="1100">
+                <a:solidFill>
+                  <a:schemeClr val="lt1"/>
+                </a:solidFill>
+                <a:latin typeface="+mn-lt"/>
+                <a:ea typeface="+mn-ea"/>
+                <a:cs typeface="+mn-cs"/>
+              </a:defRPr>
+            </a:lvl5pPr>
+            <a:lvl6pPr marL="2286000" indent="0">
+              <a:defRPr sz="1100">
+                <a:solidFill>
+                  <a:schemeClr val="lt1"/>
+                </a:solidFill>
+                <a:latin typeface="+mn-lt"/>
+                <a:ea typeface="+mn-ea"/>
+                <a:cs typeface="+mn-cs"/>
+              </a:defRPr>
+            </a:lvl6pPr>
+            <a:lvl7pPr marL="2743200" indent="0">
+              <a:defRPr sz="1100">
+                <a:solidFill>
+                  <a:schemeClr val="lt1"/>
+                </a:solidFill>
+                <a:latin typeface="+mn-lt"/>
+                <a:ea typeface="+mn-ea"/>
+                <a:cs typeface="+mn-cs"/>
+              </a:defRPr>
+            </a:lvl7pPr>
+            <a:lvl8pPr marL="3200400" indent="0">
+              <a:defRPr sz="1100">
+                <a:solidFill>
+                  <a:schemeClr val="lt1"/>
+                </a:solidFill>
+                <a:latin typeface="+mn-lt"/>
+                <a:ea typeface="+mn-ea"/>
+                <a:cs typeface="+mn-cs"/>
+              </a:defRPr>
+            </a:lvl8pPr>
+            <a:lvl9pPr marL="3657600" indent="0">
+              <a:defRPr sz="1100">
+                <a:solidFill>
+                  <a:schemeClr val="lt1"/>
+                </a:solidFill>
+                <a:latin typeface="+mn-lt"/>
+                <a:ea typeface="+mn-ea"/>
+                <a:cs typeface="+mn-cs"/>
+              </a:defRPr>
+            </a:lvl9pPr>
+          </a:lstStyle>
+          <a:p>
+            <a:pPr algn="ctr"/>
+            <a:endParaRPr lang="en-US"/>
+          </a:p>
+        </p:txBody>
+      </p:sp>
+      <p:pic>
+        <p:nvPicPr>
+          <p:cNvPr id="34" name="Picture 2">
+            <a:extLst>
+              <a:ext uri="{FF2B5EF4-FFF2-40B4-BE49-F238E27FC236}">
+                <a16:creationId xmlns:a16="http://schemas.microsoft.com/office/drawing/2014/main" id="{B8E6BC07-9301-4016-8EC1-B3C1B059AE7A}"/>
+              </a:ext>
+            </a:extLst>
+          </p:cNvPr>
+          <p:cNvPicPr>
+            <a:picLocks noChangeAspect="1" noChangeArrowheads="1"/>
+          </p:cNvPicPr>
+          <p:nvPr/>
+        </p:nvPicPr>
+        <p:blipFill>
+          <a:blip r:embed="rId6">
+            <a:extLst>
+              <a:ext uri="{28A0092B-C50C-407E-A947-70E740481C1C}">
+                <a14:useLocalDpi xmlns:a14="http://schemas.microsoft.com/office/drawing/2010/main" val="0"/>
+              </a:ext>
+            </a:extLst>
+          </a:blip>
+          <a:srcRect/>
+          <a:stretch>
+            <a:fillRect/>
+          </a:stretch>
+        </p:blipFill>
+        <p:spPr bwMode="auto">
+          <a:xfrm>
+            <a:off x="3964478" y="1531358"/>
+            <a:ext cx="416684" cy="408350"/>
+          </a:xfrm>
+          <a:prstGeom prst="rect">
+            <a:avLst/>
+          </a:prstGeom>
+          <a:noFill/>
+          <a:extLst>
+            <a:ext uri="{909E8E84-426E-40DD-AFC4-6F175D3DCCD1}">
+              <a14:hiddenFill xmlns:a14="http://schemas.microsoft.com/office/drawing/2010/main">
+                <a:solidFill>
+                  <a:srgbClr val="FFFFFF"/>
+                </a:solidFill>
+              </a14:hiddenFill>
+            </a:ext>
+          </a:extLst>
+        </p:spPr>
+      </p:pic>
+      <p:pic>
+        <p:nvPicPr>
+          <p:cNvPr id="35" name="Picture 2">
+            <a:extLst>
+              <a:ext uri="{FF2B5EF4-FFF2-40B4-BE49-F238E27FC236}">
+                <a16:creationId xmlns:a16="http://schemas.microsoft.com/office/drawing/2014/main" id="{E23AB364-33BC-474F-A695-2DB01AD76701}"/>
+              </a:ext>
+            </a:extLst>
+          </p:cNvPr>
+          <p:cNvPicPr>
+            <a:picLocks noChangeAspect="1" noChangeArrowheads="1"/>
+          </p:cNvPicPr>
+          <p:nvPr/>
+        </p:nvPicPr>
+        <p:blipFill>
+          <a:blip r:embed="rId6">
+            <a:extLst>
+              <a:ext uri="{28A0092B-C50C-407E-A947-70E740481C1C}">
+                <a14:useLocalDpi xmlns:a14="http://schemas.microsoft.com/office/drawing/2010/main" val="0"/>
+              </a:ext>
+            </a:extLst>
+          </a:blip>
+          <a:srcRect/>
+          <a:stretch>
+            <a:fillRect/>
+          </a:stretch>
+        </p:blipFill>
+        <p:spPr bwMode="auto">
+          <a:xfrm>
+            <a:off x="6567315" y="1075919"/>
+            <a:ext cx="416684" cy="408350"/>
+          </a:xfrm>
+          <a:prstGeom prst="rect">
+            <a:avLst/>
+          </a:prstGeom>
+          <a:noFill/>
+          <a:extLst>
+            <a:ext uri="{909E8E84-426E-40DD-AFC4-6F175D3DCCD1}">
+              <a14:hiddenFill xmlns:a14="http://schemas.microsoft.com/office/drawing/2010/main">
+                <a:solidFill>
+                  <a:srgbClr val="FFFFFF"/>
+                </a:solidFill>
+              </a14:hiddenFill>
+            </a:ext>
+          </a:extLst>
+        </p:spPr>
+      </p:pic>
+      <p:pic>
+        <p:nvPicPr>
+          <p:cNvPr id="36" name="Picture 2">
+            <a:extLst>
+              <a:ext uri="{FF2B5EF4-FFF2-40B4-BE49-F238E27FC236}">
+                <a16:creationId xmlns:a16="http://schemas.microsoft.com/office/drawing/2014/main" id="{92D6519E-05A0-45B1-8EE1-6EBEAA6DBC1F}"/>
+              </a:ext>
+            </a:extLst>
+          </p:cNvPr>
+          <p:cNvPicPr>
+            <a:picLocks noChangeAspect="1" noChangeArrowheads="1"/>
+          </p:cNvPicPr>
+          <p:nvPr/>
+        </p:nvPicPr>
+        <p:blipFill>
+          <a:blip r:embed="rId6">
+            <a:extLst>
+              <a:ext uri="{28A0092B-C50C-407E-A947-70E740481C1C}">
+                <a14:useLocalDpi xmlns:a14="http://schemas.microsoft.com/office/drawing/2010/main" val="0"/>
+              </a:ext>
+            </a:extLst>
+          </a:blip>
+          <a:srcRect/>
+          <a:stretch>
+            <a:fillRect/>
+          </a:stretch>
+        </p:blipFill>
+        <p:spPr bwMode="auto">
+          <a:xfrm>
+            <a:off x="6558444" y="2216970"/>
+            <a:ext cx="416684" cy="408350"/>
+          </a:xfrm>
+          <a:prstGeom prst="rect">
+            <a:avLst/>
+          </a:prstGeom>
+          <a:noFill/>
+          <a:extLst>
+            <a:ext uri="{909E8E84-426E-40DD-AFC4-6F175D3DCCD1}">
+              <a14:hiddenFill xmlns:a14="http://schemas.microsoft.com/office/drawing/2010/main">
+                <a:solidFill>
+                  <a:srgbClr val="FFFFFF"/>
+                </a:solidFill>
+              </a14:hiddenFill>
+            </a:ext>
+          </a:extLst>
+        </p:spPr>
+      </p:pic>
+      <p:pic>
+        <p:nvPicPr>
+          <p:cNvPr id="37" name="Picture 2">
+            <a:extLst>
+              <a:ext uri="{FF2B5EF4-FFF2-40B4-BE49-F238E27FC236}">
+                <a16:creationId xmlns:a16="http://schemas.microsoft.com/office/drawing/2014/main" id="{20EFB7DA-954A-4DB0-A3F1-06F201B3C6DA}"/>
+              </a:ext>
+            </a:extLst>
+          </p:cNvPr>
+          <p:cNvPicPr>
+            <a:picLocks noChangeAspect="1" noChangeArrowheads="1"/>
+          </p:cNvPicPr>
+          <p:nvPr/>
+        </p:nvPicPr>
+        <p:blipFill>
+          <a:blip r:embed="rId6">
+            <a:extLst>
+              <a:ext uri="{28A0092B-C50C-407E-A947-70E740481C1C}">
+                <a14:useLocalDpi xmlns:a14="http://schemas.microsoft.com/office/drawing/2010/main" val="0"/>
+              </a:ext>
+            </a:extLst>
+          </a:blip>
+          <a:srcRect/>
+          <a:stretch>
+            <a:fillRect/>
+          </a:stretch>
+        </p:blipFill>
+        <p:spPr bwMode="auto">
+          <a:xfrm>
+            <a:off x="3990925" y="2196569"/>
+            <a:ext cx="416684" cy="408350"/>
+          </a:xfrm>
+          <a:prstGeom prst="rect">
+            <a:avLst/>
+          </a:prstGeom>
+          <a:noFill/>
+          <a:extLst>
+            <a:ext uri="{909E8E84-426E-40DD-AFC4-6F175D3DCCD1}">
+              <a14:hiddenFill xmlns:a14="http://schemas.microsoft.com/office/drawing/2010/main">
+                <a:solidFill>
+                  <a:srgbClr val="FFFFFF"/>
+                </a:solidFill>
+              </a14:hiddenFill>
+            </a:ext>
+          </a:extLst>
+        </p:spPr>
+      </p:pic>
+      <p:pic>
+        <p:nvPicPr>
+          <p:cNvPr id="39" name="Picture 2">
+            <a:extLst>
+              <a:ext uri="{FF2B5EF4-FFF2-40B4-BE49-F238E27FC236}">
+                <a16:creationId xmlns:a16="http://schemas.microsoft.com/office/drawing/2014/main" id="{ED342975-BB43-4011-BF57-656CD0E398CA}"/>
+              </a:ext>
+            </a:extLst>
+          </p:cNvPr>
+          <p:cNvPicPr>
+            <a:picLocks noChangeAspect="1" noChangeArrowheads="1"/>
+          </p:cNvPicPr>
+          <p:nvPr/>
+        </p:nvPicPr>
+        <p:blipFill>
+          <a:blip r:embed="rId6">
+            <a:extLst>
+              <a:ext uri="{28A0092B-C50C-407E-A947-70E740481C1C}">
+                <a14:useLocalDpi xmlns:a14="http://schemas.microsoft.com/office/drawing/2010/main" val="0"/>
+              </a:ext>
+            </a:extLst>
+          </a:blip>
+          <a:srcRect/>
+          <a:stretch>
+            <a:fillRect/>
+          </a:stretch>
+        </p:blipFill>
+        <p:spPr bwMode="auto">
+          <a:xfrm>
+            <a:off x="9189191" y="4529665"/>
+            <a:ext cx="416684" cy="408350"/>
+          </a:xfrm>
+          <a:prstGeom prst="rect">
+            <a:avLst/>
+          </a:prstGeom>
+          <a:noFill/>
+          <a:extLst>
+            <a:ext uri="{909E8E84-426E-40DD-AFC4-6F175D3DCCD1}">
+              <a14:hiddenFill xmlns:a14="http://schemas.microsoft.com/office/drawing/2010/main">
+                <a:solidFill>
+                  <a:srgbClr val="FFFFFF"/>
+                </a:solidFill>
+              </a14:hiddenFill>
+            </a:ext>
+          </a:extLst>
+        </p:spPr>
+      </p:pic>
+      <p:sp>
+        <p:nvSpPr>
+          <p:cNvPr id="40" name="TextBox 39">
+            <a:extLst>
+              <a:ext uri="{FF2B5EF4-FFF2-40B4-BE49-F238E27FC236}">
+                <a16:creationId xmlns:a16="http://schemas.microsoft.com/office/drawing/2014/main" id="{18D26F7E-205C-4428-8D7D-44E019B9974B}"/>
+              </a:ext>
+            </a:extLst>
+          </p:cNvPr>
+          <p:cNvSpPr txBox="1"/>
+          <p:nvPr/>
+        </p:nvSpPr>
+        <p:spPr>
+          <a:xfrm>
+            <a:off x="9563517" y="4510234"/>
+            <a:ext cx="743119" cy="400110"/>
+          </a:xfrm>
+          <a:prstGeom prst="rect">
+            <a:avLst/>
+          </a:prstGeom>
+          <a:noFill/>
+        </p:spPr>
+        <p:txBody>
+          <a:bodyPr wrap="square" rtlCol="0">
+            <a:spAutoFit/>
+          </a:bodyPr>
+          <a:lstStyle/>
+          <a:p>
+            <a:pPr algn="ctr"/>
+            <a:r>
+              <a:rPr lang="en-US" sz="1000" dirty="0"/>
+              <a:t>REST</a:t>
+            </a:r>
+          </a:p>
+          <a:p>
+            <a:pPr algn="ctr"/>
+            <a:r>
+              <a:rPr lang="en-US" sz="1000" dirty="0" err="1"/>
+              <a:t>Webclient</a:t>
+            </a:r>
+            <a:endParaRPr lang="en-US" sz="1000" dirty="0"/>
+          </a:p>
+        </p:txBody>
+      </p:sp>
+      <p:pic>
+        <p:nvPicPr>
+          <p:cNvPr id="42" name="Picture 2">
+            <a:extLst>
+              <a:ext uri="{FF2B5EF4-FFF2-40B4-BE49-F238E27FC236}">
+                <a16:creationId xmlns:a16="http://schemas.microsoft.com/office/drawing/2014/main" id="{C21913AF-906F-42F8-A1AF-81AF32AEE591}"/>
+              </a:ext>
+            </a:extLst>
+          </p:cNvPr>
+          <p:cNvPicPr>
+            <a:picLocks noChangeAspect="1" noChangeArrowheads="1"/>
+          </p:cNvPicPr>
+          <p:nvPr/>
+        </p:nvPicPr>
+        <p:blipFill>
+          <a:blip r:embed="rId6">
+            <a:extLst>
+              <a:ext uri="{28A0092B-C50C-407E-A947-70E740481C1C}">
+                <a14:useLocalDpi xmlns:a14="http://schemas.microsoft.com/office/drawing/2010/main" val="0"/>
+              </a:ext>
+            </a:extLst>
+          </a:blip>
+          <a:srcRect/>
+          <a:stretch>
+            <a:fillRect/>
+          </a:stretch>
+        </p:blipFill>
+        <p:spPr bwMode="auto">
+          <a:xfrm>
+            <a:off x="8799309" y="1552203"/>
+            <a:ext cx="416684" cy="408350"/>
+          </a:xfrm>
+          <a:prstGeom prst="rect">
+            <a:avLst/>
+          </a:prstGeom>
+          <a:noFill/>
+          <a:extLst>
+            <a:ext uri="{909E8E84-426E-40DD-AFC4-6F175D3DCCD1}">
+              <a14:hiddenFill xmlns:a14="http://schemas.microsoft.com/office/drawing/2010/main">
+                <a:solidFill>
+                  <a:srgbClr val="FFFFFF"/>
+                </a:solidFill>
+              </a14:hiddenFill>
+            </a:ext>
+          </a:extLst>
+        </p:spPr>
+      </p:pic>
+    </p:spTree>
+    <p:extLst>
+      <p:ext uri="{BB962C8B-B14F-4D97-AF65-F5344CB8AC3E}">
+        <p14:creationId xmlns:p14="http://schemas.microsoft.com/office/powerpoint/2010/main" val="3692596921"/>
       </p:ext>
     </p:extLst>
   </p:cSld>

</xml_diff>